<commit_message>
fix lines in pdfs
</commit_message>
<xml_diff>
--- a/presentations/bag-of-words.pptx
+++ b/presentations/bag-of-words.pptx
@@ -236,7 +236,7 @@
           <a:p>
             <a:fld id="{06220CBB-D972-D444-8592-B23A7758CEF7}" type="datetimeFigureOut">
               <a:rPr lang="en-US" smtClean="0"/>
-              <a:t>1/18/26</a:t>
+              <a:t>1/19/26</a:t>
             </a:fld>
             <a:endParaRPr lang="en-US"/>
           </a:p>
@@ -1520,7 +1520,7 @@
             <a:fld id="{46D46D31-4F81-C84C-9C9E-CC304FB2B6EB}" type="datetimeFigureOut">
               <a:rPr lang="en-US" smtClean="0"/>
               <a:pPr/>
-              <a:t>1/18/26</a:t>
+              <a:t>1/19/26</a:t>
             </a:fld>
             <a:endParaRPr lang="en-US" dirty="0"/>
           </a:p>
@@ -2245,7 +2245,7 @@
             <a:fld id="{46D46D31-4F81-C84C-9C9E-CC304FB2B6EB}" type="datetimeFigureOut">
               <a:rPr lang="en-US" smtClean="0"/>
               <a:pPr/>
-              <a:t>1/18/26</a:t>
+              <a:t>1/19/26</a:t>
             </a:fld>
             <a:endParaRPr lang="en-US" dirty="0"/>
           </a:p>
@@ -2935,7 +2935,7 @@
             <a:fld id="{46D46D31-4F81-C84C-9C9E-CC304FB2B6EB}" type="datetimeFigureOut">
               <a:rPr lang="en-US" smtClean="0"/>
               <a:pPr/>
-              <a:t>1/18/26</a:t>
+              <a:t>1/19/26</a:t>
             </a:fld>
             <a:endParaRPr lang="en-US" dirty="0"/>
           </a:p>
@@ -3496,7 +3496,7 @@
             <a:fld id="{46D46D31-4F81-C84C-9C9E-CC304FB2B6EB}" type="datetimeFigureOut">
               <a:rPr lang="en-US" smtClean="0"/>
               <a:pPr/>
-              <a:t>1/18/26</a:t>
+              <a:t>1/19/26</a:t>
             </a:fld>
             <a:endParaRPr lang="en-US" dirty="0"/>
           </a:p>
@@ -4109,7 +4109,7 @@
             <a:fld id="{46D46D31-4F81-C84C-9C9E-CC304FB2B6EB}" type="datetimeFigureOut">
               <a:rPr lang="en-US" smtClean="0"/>
               <a:pPr/>
-              <a:t>1/18/26</a:t>
+              <a:t>1/19/26</a:t>
             </a:fld>
             <a:endParaRPr lang="en-US" dirty="0"/>
           </a:p>
@@ -4737,7 +4737,7 @@
             <a:fld id="{46D46D31-4F81-C84C-9C9E-CC304FB2B6EB}" type="datetimeFigureOut">
               <a:rPr lang="en-US" smtClean="0"/>
               <a:pPr/>
-              <a:t>1/18/26</a:t>
+              <a:t>1/19/26</a:t>
             </a:fld>
             <a:endParaRPr lang="en-US" dirty="0"/>
           </a:p>
@@ -5351,7 +5351,7 @@
             <a:fld id="{46D46D31-4F81-C84C-9C9E-CC304FB2B6EB}" type="datetimeFigureOut">
               <a:rPr lang="en-US" smtClean="0"/>
               <a:pPr/>
-              <a:t>1/18/26</a:t>
+              <a:t>1/19/26</a:t>
             </a:fld>
             <a:endParaRPr lang="en-US" dirty="0"/>
           </a:p>
@@ -5851,7 +5851,7 @@
             <a:fld id="{46D46D31-4F81-C84C-9C9E-CC304FB2B6EB}" type="datetimeFigureOut">
               <a:rPr lang="en-US" smtClean="0"/>
               <a:pPr/>
-              <a:t>1/18/26</a:t>
+              <a:t>1/19/26</a:t>
             </a:fld>
             <a:endParaRPr lang="en-US" dirty="0"/>
           </a:p>
@@ -6570,7 +6570,7 @@
             <a:fld id="{46D46D31-4F81-C84C-9C9E-CC304FB2B6EB}" type="datetimeFigureOut">
               <a:rPr lang="en-US" smtClean="0"/>
               <a:pPr/>
-              <a:t>1/18/26</a:t>
+              <a:t>1/19/26</a:t>
             </a:fld>
             <a:endParaRPr lang="en-US" dirty="0"/>
           </a:p>
@@ -7726,7 +7726,7 @@
             <a:fld id="{46D46D31-4F81-C84C-9C9E-CC304FB2B6EB}" type="datetimeFigureOut">
               <a:rPr lang="en-US" smtClean="0"/>
               <a:pPr/>
-              <a:t>1/18/26</a:t>
+              <a:t>1/19/26</a:t>
             </a:fld>
             <a:endParaRPr lang="en-US" dirty="0"/>
           </a:p>
@@ -9657,7 +9657,7 @@
           <a:p>
             <a:fld id="{51054624-0223-5041-BD13-AE5BA7BAECFD}" type="datetimeFigureOut">
               <a:rPr lang="en-GB" smtClean="0"/>
-              <a:t>18/01/2026</a:t>
+              <a:t>19/01/2026</a:t>
             </a:fld>
             <a:endParaRPr lang="en-GB"/>
           </a:p>
@@ -14935,7 +14935,7 @@
           <a:prstGeom prst="line">
             <a:avLst/>
           </a:prstGeom>
-          <a:ln w="0">
+          <a:ln w="12700">
             <a:solidFill>
               <a:srgbClr val="000000"/>
             </a:solidFill>
@@ -14976,7 +14976,7 @@
           <a:prstGeom prst="line">
             <a:avLst/>
           </a:prstGeom>
-          <a:ln w="0">
+          <a:ln w="12700">
             <a:solidFill>
               <a:srgbClr val="000000"/>
             </a:solidFill>
@@ -15017,7 +15017,7 @@
           <a:prstGeom prst="line">
             <a:avLst/>
           </a:prstGeom>
-          <a:ln w="0">
+          <a:ln w="12700">
             <a:solidFill>
               <a:srgbClr val="000000"/>
             </a:solidFill>
@@ -15061,7 +15061,7 @@
           <a:solidFill>
             <a:srgbClr val="729FCF"/>
           </a:solidFill>
-          <a:ln w="0">
+          <a:ln w="12700">
             <a:solidFill>
               <a:srgbClr val="3465A4"/>
             </a:solidFill>
@@ -15192,7 +15192,7 @@
           <a:solidFill>
             <a:srgbClr val="729FCF"/>
           </a:solidFill>
-          <a:ln w="0">
+          <a:ln w="12700">
             <a:solidFill>
               <a:srgbClr val="3465A4"/>
             </a:solidFill>
@@ -15235,7 +15235,7 @@
           <a:solidFill>
             <a:srgbClr val="729FCF"/>
           </a:solidFill>
-          <a:ln w="0">
+          <a:ln w="12700">
             <a:solidFill>
               <a:srgbClr val="3465A4"/>
             </a:solidFill>
@@ -15559,7 +15559,7 @@
           <a:solidFill>
             <a:srgbClr val="729FCF"/>
           </a:solidFill>
-          <a:ln w="0">
+          <a:ln w="12700">
             <a:solidFill>
               <a:srgbClr val="3465A4"/>
             </a:solidFill>
@@ -15822,7 +15822,7 @@
           <a:solidFill>
             <a:srgbClr val="729FCF"/>
           </a:solidFill>
-          <a:ln w="0">
+          <a:ln w="12700">
             <a:solidFill>
               <a:srgbClr val="3465A4"/>
             </a:solidFill>
@@ -16071,7 +16071,7 @@
           <a:prstGeom prst="line">
             <a:avLst/>
           </a:prstGeom>
-          <a:ln w="0">
+          <a:ln w="12700">
             <a:solidFill>
               <a:srgbClr val="000000"/>
             </a:solidFill>
@@ -16112,7 +16112,7 @@
           <a:prstGeom prst="line">
             <a:avLst/>
           </a:prstGeom>
-          <a:ln w="0">
+          <a:ln w="12700">
             <a:solidFill>
               <a:srgbClr val="000000"/>
             </a:solidFill>
@@ -16153,7 +16153,7 @@
           <a:prstGeom prst="line">
             <a:avLst/>
           </a:prstGeom>
-          <a:ln w="0">
+          <a:ln w="12700">
             <a:solidFill>
               <a:srgbClr val="000000"/>
             </a:solidFill>
@@ -16197,7 +16197,7 @@
           <a:solidFill>
             <a:srgbClr val="729FCF"/>
           </a:solidFill>
-          <a:ln w="0">
+          <a:ln w="12700">
             <a:solidFill>
               <a:srgbClr val="3465A4"/>
             </a:solidFill>
@@ -16328,7 +16328,7 @@
           <a:solidFill>
             <a:srgbClr val="729FCF"/>
           </a:solidFill>
-          <a:ln w="0">
+          <a:ln w="12700">
             <a:solidFill>
               <a:srgbClr val="3465A4"/>
             </a:solidFill>
@@ -16350,7 +16350,7 @@
           <a:bodyPr/>
           <a:lstStyle/>
           <a:p>
-            <a:endParaRPr lang="en-US"/>
+            <a:endParaRPr lang="en-US" dirty="0"/>
           </a:p>
         </p:txBody>
       </p:sp>
@@ -16371,7 +16371,7 @@
           <a:solidFill>
             <a:srgbClr val="729FCF"/>
           </a:solidFill>
-          <a:ln w="0">
+          <a:ln w="12700">
             <a:solidFill>
               <a:srgbClr val="3465A4"/>
             </a:solidFill>
@@ -16393,7 +16393,7 @@
           <a:bodyPr/>
           <a:lstStyle/>
           <a:p>
-            <a:endParaRPr lang="en-US"/>
+            <a:endParaRPr lang="en-US" dirty="0"/>
           </a:p>
         </p:txBody>
       </p:sp>
@@ -16695,7 +16695,7 @@
           <a:solidFill>
             <a:srgbClr val="729FCF"/>
           </a:solidFill>
-          <a:ln w="0">
+          <a:ln w="12700">
             <a:solidFill>
               <a:srgbClr val="3465A4"/>
             </a:solidFill>
@@ -16723,10 +16723,10 @@
       </p:sp>
       <p:sp>
         <p:nvSpPr>
-          <p:cNvPr id="5" name="Line 8">
+          <p:cNvPr id="6" name="Line 9">
             <a:extLst>
               <a:ext uri="{FF2B5EF4-FFF2-40B4-BE49-F238E27FC236}">
-                <a16:creationId xmlns:a16="http://schemas.microsoft.com/office/drawing/2014/main" id="{E096D6F1-0FA1-DE1A-9112-E2E9DB10A35E}"/>
+                <a16:creationId xmlns:a16="http://schemas.microsoft.com/office/drawing/2014/main" id="{EB410880-BECC-2634-121A-3832A35850FC}"/>
               </a:ext>
             </a:extLst>
           </p:cNvPr>
@@ -16734,9 +16734,9 @@
           <p:nvPr/>
         </p:nvSpPr>
         <p:spPr>
-          <a:xfrm flipH="1" flipV="1">
-            <a:off x="7872046" y="2575385"/>
-            <a:ext cx="971013" cy="0"/>
+          <a:xfrm flipV="1">
+            <a:off x="9084000" y="2762974"/>
+            <a:ext cx="0" cy="900720"/>
           </a:xfrm>
           <a:prstGeom prst="line">
             <a:avLst/>
@@ -16773,10 +16773,170 @@
       </p:sp>
       <p:sp>
         <p:nvSpPr>
-          <p:cNvPr id="6" name="Line 9">
+          <p:cNvPr id="7" name="TextShape 24">
             <a:extLst>
               <a:ext uri="{FF2B5EF4-FFF2-40B4-BE49-F238E27FC236}">
-                <a16:creationId xmlns:a16="http://schemas.microsoft.com/office/drawing/2014/main" id="{EB410880-BECC-2634-121A-3832A35850FC}"/>
+                <a16:creationId xmlns:a16="http://schemas.microsoft.com/office/drawing/2014/main" id="{2FB01EA0-DDA7-19C6-4BF9-21FA8EC512CC}"/>
+              </a:ext>
+            </a:extLst>
+          </p:cNvPr>
+          <p:cNvSpPr txBox="1"/>
+          <p:nvPr/>
+        </p:nvSpPr>
+        <p:spPr>
+          <a:xfrm>
+            <a:off x="7854900" y="2242110"/>
+            <a:ext cx="280470" cy="302580"/>
+          </a:xfrm>
+          <a:prstGeom prst="rect">
+            <a:avLst/>
+          </a:prstGeom>
+          <a:noFill/>
+          <a:ln w="0">
+            <a:noFill/>
+          </a:ln>
+        </p:spPr>
+        <p:txBody>
+          <a:bodyPr lIns="90000" tIns="45000" rIns="90000" bIns="45000">
+            <a:noAutofit/>
+          </a:bodyPr>
+          <a:lstStyle/>
+          <a:p>
+            <a:r>
+              <a:rPr lang="en-GB" sz="1400" spc="-1" dirty="0">
+                <a:latin typeface="Arial"/>
+              </a:rPr>
+              <a:t>1</a:t>
+            </a:r>
+          </a:p>
+        </p:txBody>
+      </p:sp>
+      <p:sp>
+        <p:nvSpPr>
+          <p:cNvPr id="8" name="TextShape 24">
+            <a:extLst>
+              <a:ext uri="{FF2B5EF4-FFF2-40B4-BE49-F238E27FC236}">
+                <a16:creationId xmlns:a16="http://schemas.microsoft.com/office/drawing/2014/main" id="{8A5C7048-220D-05EA-06FC-9C0B3AB7E0A3}"/>
+              </a:ext>
+            </a:extLst>
+          </p:cNvPr>
+          <p:cNvSpPr txBox="1"/>
+          <p:nvPr/>
+        </p:nvSpPr>
+        <p:spPr>
+          <a:xfrm>
+            <a:off x="7441400" y="4002791"/>
+            <a:ext cx="280470" cy="302580"/>
+          </a:xfrm>
+          <a:prstGeom prst="rect">
+            <a:avLst/>
+          </a:prstGeom>
+          <a:noFill/>
+          <a:ln w="0">
+            <a:noFill/>
+          </a:ln>
+        </p:spPr>
+        <p:txBody>
+          <a:bodyPr lIns="90000" tIns="45000" rIns="90000" bIns="45000">
+            <a:noAutofit/>
+          </a:bodyPr>
+          <a:lstStyle/>
+          <a:p>
+            <a:r>
+              <a:rPr lang="en-GB" sz="1400" spc="-1" dirty="0">
+                <a:latin typeface="Arial"/>
+              </a:rPr>
+              <a:t>1</a:t>
+            </a:r>
+          </a:p>
+        </p:txBody>
+      </p:sp>
+      <p:sp>
+        <p:nvSpPr>
+          <p:cNvPr id="9" name="TextShape 24">
+            <a:extLst>
+              <a:ext uri="{FF2B5EF4-FFF2-40B4-BE49-F238E27FC236}">
+                <a16:creationId xmlns:a16="http://schemas.microsoft.com/office/drawing/2014/main" id="{CDEC86B6-5216-6F63-E654-002CDD775C5E}"/>
+              </a:ext>
+            </a:extLst>
+          </p:cNvPr>
+          <p:cNvSpPr txBox="1"/>
+          <p:nvPr/>
+        </p:nvSpPr>
+        <p:spPr>
+          <a:xfrm>
+            <a:off x="9116290" y="3512404"/>
+            <a:ext cx="280470" cy="302580"/>
+          </a:xfrm>
+          <a:prstGeom prst="rect">
+            <a:avLst/>
+          </a:prstGeom>
+          <a:noFill/>
+          <a:ln w="0">
+            <a:noFill/>
+          </a:ln>
+        </p:spPr>
+        <p:txBody>
+          <a:bodyPr lIns="90000" tIns="45000" rIns="90000" bIns="45000">
+            <a:noAutofit/>
+          </a:bodyPr>
+          <a:lstStyle/>
+          <a:p>
+            <a:r>
+              <a:rPr lang="en-GB" sz="1400" spc="-1" dirty="0">
+                <a:latin typeface="Arial"/>
+              </a:rPr>
+              <a:t>1</a:t>
+            </a:r>
+          </a:p>
+        </p:txBody>
+      </p:sp>
+      <p:sp>
+        <p:nvSpPr>
+          <p:cNvPr id="10" name="TextShape 23">
+            <a:extLst>
+              <a:ext uri="{FF2B5EF4-FFF2-40B4-BE49-F238E27FC236}">
+                <a16:creationId xmlns:a16="http://schemas.microsoft.com/office/drawing/2014/main" id="{1FE8B79E-55ED-F198-08A1-E73774798E2F}"/>
+              </a:ext>
+            </a:extLst>
+          </p:cNvPr>
+          <p:cNvSpPr txBox="1"/>
+          <p:nvPr/>
+        </p:nvSpPr>
+        <p:spPr>
+          <a:xfrm>
+            <a:off x="6908017" y="2533170"/>
+            <a:ext cx="953280" cy="489960"/>
+          </a:xfrm>
+          <a:prstGeom prst="rect">
+            <a:avLst/>
+          </a:prstGeom>
+          <a:noFill/>
+          <a:ln w="0">
+            <a:noFill/>
+          </a:ln>
+        </p:spPr>
+        <p:txBody>
+          <a:bodyPr lIns="90000" tIns="45000" rIns="90000" bIns="45000">
+            <a:noAutofit/>
+          </a:bodyPr>
+          <a:lstStyle/>
+          <a:p>
+            <a:r>
+              <a:rPr lang="en-GB" sz="1400" spc="-1" dirty="0">
+                <a:latin typeface="Arial"/>
+              </a:rPr>
+              <a:t>loved it!</a:t>
+            </a:r>
+          </a:p>
+        </p:txBody>
+      </p:sp>
+      <p:sp>
+        <p:nvSpPr>
+          <p:cNvPr id="12" name="Line 6">
+            <a:extLst>
+              <a:ext uri="{FF2B5EF4-FFF2-40B4-BE49-F238E27FC236}">
+                <a16:creationId xmlns:a16="http://schemas.microsoft.com/office/drawing/2014/main" id="{31BEB694-6175-5640-FF21-6F6AABB3518F}"/>
               </a:ext>
             </a:extLst>
           </p:cNvPr>
@@ -16784,9 +16944,432 @@
           <p:nvPr/>
         </p:nvSpPr>
         <p:spPr>
+          <a:xfrm flipH="1">
+            <a:off x="6093934" y="1564919"/>
+            <a:ext cx="1766038" cy="1675037"/>
+          </a:xfrm>
+          <a:prstGeom prst="line">
+            <a:avLst/>
+          </a:prstGeom>
+          <a:ln w="12700">
+            <a:solidFill>
+              <a:srgbClr val="000000"/>
+            </a:solidFill>
+            <a:tailEnd type="none" w="med" len="med"/>
+          </a:ln>
+        </p:spPr>
+        <p:style>
+          <a:lnRef idx="0">
+            <a:scrgbClr r="0" g="0" b="0"/>
+          </a:lnRef>
+          <a:fillRef idx="0">
+            <a:scrgbClr r="0" g="0" b="0"/>
+          </a:fillRef>
+          <a:effectRef idx="0">
+            <a:scrgbClr r="0" g="0" b="0"/>
+          </a:effectRef>
+          <a:fontRef idx="minor"/>
+        </p:style>
+        <p:txBody>
+          <a:bodyPr/>
+          <a:lstStyle/>
+          <a:p>
+            <a:endParaRPr lang="en-US"/>
+          </a:p>
+        </p:txBody>
+      </p:sp>
+      <p:sp>
+        <p:nvSpPr>
+          <p:cNvPr id="13" name="Line 4">
+            <a:extLst>
+              <a:ext uri="{FF2B5EF4-FFF2-40B4-BE49-F238E27FC236}">
+                <a16:creationId xmlns:a16="http://schemas.microsoft.com/office/drawing/2014/main" id="{224019EC-586B-1E99-A034-224F518AF74D}"/>
+              </a:ext>
+            </a:extLst>
+          </p:cNvPr>
+          <p:cNvSpPr/>
+          <p:nvPr/>
+        </p:nvSpPr>
+        <p:spPr>
           <a:xfrm flipV="1">
-            <a:off x="9084000" y="2762974"/>
-            <a:ext cx="0" cy="900720"/>
+            <a:off x="7868745" y="1543421"/>
+            <a:ext cx="2268671" cy="14628"/>
+          </a:xfrm>
+          <a:prstGeom prst="line">
+            <a:avLst/>
+          </a:prstGeom>
+          <a:ln w="12700">
+            <a:solidFill>
+              <a:srgbClr val="000000"/>
+            </a:solidFill>
+            <a:tailEnd type="none" w="med" len="med"/>
+          </a:ln>
+        </p:spPr>
+        <p:style>
+          <a:lnRef idx="0">
+            <a:scrgbClr r="0" g="0" b="0"/>
+          </a:lnRef>
+          <a:fillRef idx="0">
+            <a:scrgbClr r="0" g="0" b="0"/>
+          </a:fillRef>
+          <a:effectRef idx="0">
+            <a:scrgbClr r="0" g="0" b="0"/>
+          </a:effectRef>
+          <a:fontRef idx="minor"/>
+        </p:style>
+        <p:txBody>
+          <a:bodyPr/>
+          <a:lstStyle/>
+          <a:p>
+            <a:endParaRPr lang="en-US"/>
+          </a:p>
+        </p:txBody>
+      </p:sp>
+      <p:sp>
+        <p:nvSpPr>
+          <p:cNvPr id="19" name="Line 6">
+            <a:extLst>
+              <a:ext uri="{FF2B5EF4-FFF2-40B4-BE49-F238E27FC236}">
+                <a16:creationId xmlns:a16="http://schemas.microsoft.com/office/drawing/2014/main" id="{1E6D1E62-0390-DC27-647B-AD2FD0F4A7B6}"/>
+              </a:ext>
+            </a:extLst>
+          </p:cNvPr>
+          <p:cNvSpPr/>
+          <p:nvPr/>
+        </p:nvSpPr>
+        <p:spPr>
+          <a:xfrm flipH="1">
+            <a:off x="8432287" y="3740835"/>
+            <a:ext cx="1724623" cy="1715926"/>
+          </a:xfrm>
+          <a:prstGeom prst="line">
+            <a:avLst/>
+          </a:prstGeom>
+          <a:ln w="12700">
+            <a:solidFill>
+              <a:srgbClr val="000000"/>
+            </a:solidFill>
+            <a:tailEnd type="none" w="med" len="med"/>
+          </a:ln>
+        </p:spPr>
+        <p:style>
+          <a:lnRef idx="0">
+            <a:scrgbClr r="0" g="0" b="0"/>
+          </a:lnRef>
+          <a:fillRef idx="0">
+            <a:scrgbClr r="0" g="0" b="0"/>
+          </a:fillRef>
+          <a:effectRef idx="0">
+            <a:scrgbClr r="0" g="0" b="0"/>
+          </a:effectRef>
+          <a:fontRef idx="minor"/>
+        </p:style>
+        <p:txBody>
+          <a:bodyPr/>
+          <a:lstStyle/>
+          <a:p>
+            <a:endParaRPr lang="en-US"/>
+          </a:p>
+        </p:txBody>
+      </p:sp>
+      <p:sp>
+        <p:nvSpPr>
+          <p:cNvPr id="20" name="Line 6">
+            <a:extLst>
+              <a:ext uri="{FF2B5EF4-FFF2-40B4-BE49-F238E27FC236}">
+                <a16:creationId xmlns:a16="http://schemas.microsoft.com/office/drawing/2014/main" id="{734FC62D-3318-9F72-4265-0136235FDA91}"/>
+              </a:ext>
+            </a:extLst>
+          </p:cNvPr>
+          <p:cNvSpPr/>
+          <p:nvPr/>
+        </p:nvSpPr>
+        <p:spPr>
+          <a:xfrm flipH="1">
+            <a:off x="8392524" y="1543421"/>
+            <a:ext cx="1744893" cy="1696537"/>
+          </a:xfrm>
+          <a:prstGeom prst="line">
+            <a:avLst/>
+          </a:prstGeom>
+          <a:ln w="12700">
+            <a:solidFill>
+              <a:srgbClr val="000000"/>
+            </a:solidFill>
+            <a:tailEnd type="none" w="med" len="med"/>
+          </a:ln>
+        </p:spPr>
+        <p:style>
+          <a:lnRef idx="0">
+            <a:scrgbClr r="0" g="0" b="0"/>
+          </a:lnRef>
+          <a:fillRef idx="0">
+            <a:scrgbClr r="0" g="0" b="0"/>
+          </a:fillRef>
+          <a:effectRef idx="0">
+            <a:scrgbClr r="0" g="0" b="0"/>
+          </a:effectRef>
+          <a:fontRef idx="minor"/>
+        </p:style>
+        <p:txBody>
+          <a:bodyPr/>
+          <a:lstStyle/>
+          <a:p>
+            <a:endParaRPr lang="en-US"/>
+          </a:p>
+        </p:txBody>
+      </p:sp>
+      <p:sp>
+        <p:nvSpPr>
+          <p:cNvPr id="27" name="Line 5">
+            <a:extLst>
+              <a:ext uri="{FF2B5EF4-FFF2-40B4-BE49-F238E27FC236}">
+                <a16:creationId xmlns:a16="http://schemas.microsoft.com/office/drawing/2014/main" id="{5EFD8680-9FCF-54DC-BB53-EFA1CDAE1D96}"/>
+              </a:ext>
+            </a:extLst>
+          </p:cNvPr>
+          <p:cNvSpPr/>
+          <p:nvPr/>
+        </p:nvSpPr>
+        <p:spPr>
+          <a:xfrm flipH="1" flipV="1">
+            <a:off x="10137420" y="1544248"/>
+            <a:ext cx="29566" cy="2197414"/>
+          </a:xfrm>
+          <a:prstGeom prst="line">
+            <a:avLst/>
+          </a:prstGeom>
+          <a:ln w="12700">
+            <a:solidFill>
+              <a:srgbClr val="000000"/>
+            </a:solidFill>
+            <a:tailEnd type="none" w="med" len="med"/>
+          </a:ln>
+        </p:spPr>
+        <p:style>
+          <a:lnRef idx="0">
+            <a:scrgbClr r="0" g="0" b="0"/>
+          </a:lnRef>
+          <a:fillRef idx="0">
+            <a:scrgbClr r="0" g="0" b="0"/>
+          </a:fillRef>
+          <a:effectRef idx="0">
+            <a:scrgbClr r="0" g="0" b="0"/>
+          </a:effectRef>
+          <a:fontRef idx="minor"/>
+        </p:style>
+        <p:txBody>
+          <a:bodyPr/>
+          <a:lstStyle/>
+          <a:p>
+            <a:endParaRPr lang="en-US"/>
+          </a:p>
+        </p:txBody>
+      </p:sp>
+      <p:sp>
+        <p:nvSpPr>
+          <p:cNvPr id="28" name="Line 4">
+            <a:extLst>
+              <a:ext uri="{FF2B5EF4-FFF2-40B4-BE49-F238E27FC236}">
+                <a16:creationId xmlns:a16="http://schemas.microsoft.com/office/drawing/2014/main" id="{4F6E8361-3726-6096-757E-39A9A80132A5}"/>
+              </a:ext>
+            </a:extLst>
+          </p:cNvPr>
+          <p:cNvSpPr/>
+          <p:nvPr/>
+        </p:nvSpPr>
+        <p:spPr>
+          <a:xfrm>
+            <a:off x="6096000" y="3232850"/>
+            <a:ext cx="2304000" cy="0"/>
+          </a:xfrm>
+          <a:prstGeom prst="line">
+            <a:avLst/>
+          </a:prstGeom>
+          <a:ln w="12700">
+            <a:solidFill>
+              <a:srgbClr val="000000"/>
+            </a:solidFill>
+            <a:tailEnd type="none" w="med" len="med"/>
+          </a:ln>
+        </p:spPr>
+        <p:style>
+          <a:lnRef idx="0">
+            <a:scrgbClr r="0" g="0" b="0"/>
+          </a:lnRef>
+          <a:fillRef idx="0">
+            <a:scrgbClr r="0" g="0" b="0"/>
+          </a:fillRef>
+          <a:effectRef idx="0">
+            <a:scrgbClr r="0" g="0" b="0"/>
+          </a:effectRef>
+          <a:fontRef idx="minor"/>
+        </p:style>
+        <p:txBody>
+          <a:bodyPr/>
+          <a:lstStyle/>
+          <a:p>
+            <a:endParaRPr lang="en-US"/>
+          </a:p>
+        </p:txBody>
+      </p:sp>
+      <p:sp>
+        <p:nvSpPr>
+          <p:cNvPr id="29" name="Line 4">
+            <a:extLst>
+              <a:ext uri="{FF2B5EF4-FFF2-40B4-BE49-F238E27FC236}">
+                <a16:creationId xmlns:a16="http://schemas.microsoft.com/office/drawing/2014/main" id="{4305790B-2085-E23A-E5F6-269196F4C79B}"/>
+              </a:ext>
+            </a:extLst>
+          </p:cNvPr>
+          <p:cNvSpPr/>
+          <p:nvPr/>
+        </p:nvSpPr>
+        <p:spPr>
+          <a:xfrm>
+            <a:off x="6093934" y="5468516"/>
+            <a:ext cx="2341507" cy="0"/>
+          </a:xfrm>
+          <a:prstGeom prst="line">
+            <a:avLst/>
+          </a:prstGeom>
+          <a:ln w="12700">
+            <a:solidFill>
+              <a:srgbClr val="000000"/>
+            </a:solidFill>
+            <a:tailEnd type="none" w="med" len="med"/>
+          </a:ln>
+        </p:spPr>
+        <p:style>
+          <a:lnRef idx="0">
+            <a:scrgbClr r="0" g="0" b="0"/>
+          </a:lnRef>
+          <a:fillRef idx="0">
+            <a:scrgbClr r="0" g="0" b="0"/>
+          </a:fillRef>
+          <a:effectRef idx="0">
+            <a:scrgbClr r="0" g="0" b="0"/>
+          </a:effectRef>
+          <a:fontRef idx="minor"/>
+        </p:style>
+        <p:txBody>
+          <a:bodyPr/>
+          <a:lstStyle/>
+          <a:p>
+            <a:endParaRPr lang="en-US"/>
+          </a:p>
+        </p:txBody>
+      </p:sp>
+      <p:sp>
+        <p:nvSpPr>
+          <p:cNvPr id="30" name="Line 5">
+            <a:extLst>
+              <a:ext uri="{FF2B5EF4-FFF2-40B4-BE49-F238E27FC236}">
+                <a16:creationId xmlns:a16="http://schemas.microsoft.com/office/drawing/2014/main" id="{16969A89-E8D2-DD52-4429-001DC3F7C125}"/>
+              </a:ext>
+            </a:extLst>
+          </p:cNvPr>
+          <p:cNvSpPr/>
+          <p:nvPr/>
+        </p:nvSpPr>
+        <p:spPr>
+          <a:xfrm flipH="1" flipV="1">
+            <a:off x="6095592" y="3239958"/>
+            <a:ext cx="22474" cy="2228558"/>
+          </a:xfrm>
+          <a:prstGeom prst="line">
+            <a:avLst/>
+          </a:prstGeom>
+          <a:ln w="12700">
+            <a:solidFill>
+              <a:srgbClr val="000000"/>
+            </a:solidFill>
+            <a:tailEnd type="none" w="med" len="med"/>
+          </a:ln>
+        </p:spPr>
+        <p:style>
+          <a:lnRef idx="0">
+            <a:scrgbClr r="0" g="0" b="0"/>
+          </a:lnRef>
+          <a:fillRef idx="0">
+            <a:scrgbClr r="0" g="0" b="0"/>
+          </a:fillRef>
+          <a:effectRef idx="0">
+            <a:scrgbClr r="0" g="0" b="0"/>
+          </a:effectRef>
+          <a:fontRef idx="minor"/>
+        </p:style>
+        <p:txBody>
+          <a:bodyPr/>
+          <a:lstStyle/>
+          <a:p>
+            <a:endParaRPr lang="en-US"/>
+          </a:p>
+        </p:txBody>
+      </p:sp>
+      <p:sp>
+        <p:nvSpPr>
+          <p:cNvPr id="31" name="Line 5">
+            <a:extLst>
+              <a:ext uri="{FF2B5EF4-FFF2-40B4-BE49-F238E27FC236}">
+                <a16:creationId xmlns:a16="http://schemas.microsoft.com/office/drawing/2014/main" id="{1A50676E-4926-26DA-A3E8-30B26102517D}"/>
+              </a:ext>
+            </a:extLst>
+          </p:cNvPr>
+          <p:cNvSpPr/>
+          <p:nvPr/>
+        </p:nvSpPr>
+        <p:spPr>
+          <a:xfrm flipH="1" flipV="1">
+            <a:off x="8406680" y="3232850"/>
+            <a:ext cx="25608" cy="2235666"/>
+          </a:xfrm>
+          <a:prstGeom prst="line">
+            <a:avLst/>
+          </a:prstGeom>
+          <a:ln w="12700">
+            <a:solidFill>
+              <a:srgbClr val="000000"/>
+            </a:solidFill>
+            <a:tailEnd type="none" w="med" len="med"/>
+          </a:ln>
+        </p:spPr>
+        <p:style>
+          <a:lnRef idx="0">
+            <a:scrgbClr r="0" g="0" b="0"/>
+          </a:lnRef>
+          <a:fillRef idx="0">
+            <a:scrgbClr r="0" g="0" b="0"/>
+          </a:fillRef>
+          <a:effectRef idx="0">
+            <a:scrgbClr r="0" g="0" b="0"/>
+          </a:effectRef>
+          <a:fontRef idx="minor"/>
+        </p:style>
+        <p:txBody>
+          <a:bodyPr/>
+          <a:lstStyle/>
+          <a:p>
+            <a:endParaRPr lang="en-US"/>
+          </a:p>
+        </p:txBody>
+      </p:sp>
+      <p:sp>
+        <p:nvSpPr>
+          <p:cNvPr id="14" name="Line 8">
+            <a:extLst>
+              <a:ext uri="{FF2B5EF4-FFF2-40B4-BE49-F238E27FC236}">
+                <a16:creationId xmlns:a16="http://schemas.microsoft.com/office/drawing/2014/main" id="{1C61218C-2ADA-C20C-B341-28ED5238D4DC}"/>
+              </a:ext>
+            </a:extLst>
+          </p:cNvPr>
+          <p:cNvSpPr/>
+          <p:nvPr/>
+        </p:nvSpPr>
+        <p:spPr>
+          <a:xfrm flipH="1" flipV="1">
+            <a:off x="7872046" y="2575385"/>
+            <a:ext cx="971013" cy="0"/>
           </a:xfrm>
           <a:prstGeom prst="line">
             <a:avLst/>
@@ -16823,126 +17406,6 @@
       </p:sp>
       <p:sp>
         <p:nvSpPr>
-          <p:cNvPr id="7" name="TextShape 24">
-            <a:extLst>
-              <a:ext uri="{FF2B5EF4-FFF2-40B4-BE49-F238E27FC236}">
-                <a16:creationId xmlns:a16="http://schemas.microsoft.com/office/drawing/2014/main" id="{2FB01EA0-DDA7-19C6-4BF9-21FA8EC512CC}"/>
-              </a:ext>
-            </a:extLst>
-          </p:cNvPr>
-          <p:cNvSpPr txBox="1"/>
-          <p:nvPr/>
-        </p:nvSpPr>
-        <p:spPr>
-          <a:xfrm>
-            <a:off x="7854900" y="2242110"/>
-            <a:ext cx="280470" cy="302580"/>
-          </a:xfrm>
-          <a:prstGeom prst="rect">
-            <a:avLst/>
-          </a:prstGeom>
-          <a:noFill/>
-          <a:ln w="0">
-            <a:noFill/>
-          </a:ln>
-        </p:spPr>
-        <p:txBody>
-          <a:bodyPr lIns="90000" tIns="45000" rIns="90000" bIns="45000">
-            <a:noAutofit/>
-          </a:bodyPr>
-          <a:lstStyle/>
-          <a:p>
-            <a:r>
-              <a:rPr lang="en-GB" sz="1400" spc="-1" dirty="0">
-                <a:latin typeface="Arial"/>
-              </a:rPr>
-              <a:t>1</a:t>
-            </a:r>
-          </a:p>
-        </p:txBody>
-      </p:sp>
-      <p:sp>
-        <p:nvSpPr>
-          <p:cNvPr id="8" name="TextShape 24">
-            <a:extLst>
-              <a:ext uri="{FF2B5EF4-FFF2-40B4-BE49-F238E27FC236}">
-                <a16:creationId xmlns:a16="http://schemas.microsoft.com/office/drawing/2014/main" id="{8A5C7048-220D-05EA-06FC-9C0B3AB7E0A3}"/>
-              </a:ext>
-            </a:extLst>
-          </p:cNvPr>
-          <p:cNvSpPr txBox="1"/>
-          <p:nvPr/>
-        </p:nvSpPr>
-        <p:spPr>
-          <a:xfrm>
-            <a:off x="7441400" y="4002791"/>
-            <a:ext cx="280470" cy="302580"/>
-          </a:xfrm>
-          <a:prstGeom prst="rect">
-            <a:avLst/>
-          </a:prstGeom>
-          <a:noFill/>
-          <a:ln w="0">
-            <a:noFill/>
-          </a:ln>
-        </p:spPr>
-        <p:txBody>
-          <a:bodyPr lIns="90000" tIns="45000" rIns="90000" bIns="45000">
-            <a:noAutofit/>
-          </a:bodyPr>
-          <a:lstStyle/>
-          <a:p>
-            <a:r>
-              <a:rPr lang="en-GB" sz="1400" spc="-1" dirty="0">
-                <a:latin typeface="Arial"/>
-              </a:rPr>
-              <a:t>1</a:t>
-            </a:r>
-          </a:p>
-        </p:txBody>
-      </p:sp>
-      <p:sp>
-        <p:nvSpPr>
-          <p:cNvPr id="9" name="TextShape 24">
-            <a:extLst>
-              <a:ext uri="{FF2B5EF4-FFF2-40B4-BE49-F238E27FC236}">
-                <a16:creationId xmlns:a16="http://schemas.microsoft.com/office/drawing/2014/main" id="{CDEC86B6-5216-6F63-E654-002CDD775C5E}"/>
-              </a:ext>
-            </a:extLst>
-          </p:cNvPr>
-          <p:cNvSpPr txBox="1"/>
-          <p:nvPr/>
-        </p:nvSpPr>
-        <p:spPr>
-          <a:xfrm>
-            <a:off x="9116290" y="3512404"/>
-            <a:ext cx="280470" cy="302580"/>
-          </a:xfrm>
-          <a:prstGeom prst="rect">
-            <a:avLst/>
-          </a:prstGeom>
-          <a:noFill/>
-          <a:ln w="0">
-            <a:noFill/>
-          </a:ln>
-        </p:spPr>
-        <p:txBody>
-          <a:bodyPr lIns="90000" tIns="45000" rIns="90000" bIns="45000">
-            <a:noAutofit/>
-          </a:bodyPr>
-          <a:lstStyle/>
-          <a:p>
-            <a:r>
-              <a:rPr lang="en-GB" sz="1400" spc="-1" dirty="0">
-                <a:latin typeface="Arial"/>
-              </a:rPr>
-              <a:t>1</a:t>
-            </a:r>
-          </a:p>
-        </p:txBody>
-      </p:sp>
-      <p:sp>
-        <p:nvSpPr>
           <p:cNvPr id="749" name="CustomShape 14"/>
           <p:cNvSpPr/>
           <p:nvPr/>
@@ -16958,473 +17421,10 @@
           <a:solidFill>
             <a:srgbClr val="729FCF"/>
           </a:solidFill>
-          <a:ln w="0">
+          <a:ln w="12700">
             <a:solidFill>
               <a:srgbClr val="3465A4"/>
             </a:solidFill>
-          </a:ln>
-        </p:spPr>
-        <p:style>
-          <a:lnRef idx="0">
-            <a:scrgbClr r="0" g="0" b="0"/>
-          </a:lnRef>
-          <a:fillRef idx="0">
-            <a:scrgbClr r="0" g="0" b="0"/>
-          </a:fillRef>
-          <a:effectRef idx="0">
-            <a:scrgbClr r="0" g="0" b="0"/>
-          </a:effectRef>
-          <a:fontRef idx="minor"/>
-        </p:style>
-        <p:txBody>
-          <a:bodyPr/>
-          <a:lstStyle/>
-          <a:p>
-            <a:endParaRPr lang="en-US"/>
-          </a:p>
-        </p:txBody>
-      </p:sp>
-      <p:sp>
-        <p:nvSpPr>
-          <p:cNvPr id="10" name="TextShape 23">
-            <a:extLst>
-              <a:ext uri="{FF2B5EF4-FFF2-40B4-BE49-F238E27FC236}">
-                <a16:creationId xmlns:a16="http://schemas.microsoft.com/office/drawing/2014/main" id="{1FE8B79E-55ED-F198-08A1-E73774798E2F}"/>
-              </a:ext>
-            </a:extLst>
-          </p:cNvPr>
-          <p:cNvSpPr txBox="1"/>
-          <p:nvPr/>
-        </p:nvSpPr>
-        <p:spPr>
-          <a:xfrm>
-            <a:off x="6908017" y="2533170"/>
-            <a:ext cx="953280" cy="489960"/>
-          </a:xfrm>
-          <a:prstGeom prst="rect">
-            <a:avLst/>
-          </a:prstGeom>
-          <a:noFill/>
-          <a:ln w="0">
-            <a:noFill/>
-          </a:ln>
-        </p:spPr>
-        <p:txBody>
-          <a:bodyPr lIns="90000" tIns="45000" rIns="90000" bIns="45000">
-            <a:noAutofit/>
-          </a:bodyPr>
-          <a:lstStyle/>
-          <a:p>
-            <a:r>
-              <a:rPr lang="en-GB" sz="1400" spc="-1" dirty="0">
-                <a:latin typeface="Arial"/>
-              </a:rPr>
-              <a:t>loved it!</a:t>
-            </a:r>
-          </a:p>
-        </p:txBody>
-      </p:sp>
-      <p:sp>
-        <p:nvSpPr>
-          <p:cNvPr id="12" name="Line 6">
-            <a:extLst>
-              <a:ext uri="{FF2B5EF4-FFF2-40B4-BE49-F238E27FC236}">
-                <a16:creationId xmlns:a16="http://schemas.microsoft.com/office/drawing/2014/main" id="{31BEB694-6175-5640-FF21-6F6AABB3518F}"/>
-              </a:ext>
-            </a:extLst>
-          </p:cNvPr>
-          <p:cNvSpPr/>
-          <p:nvPr/>
-        </p:nvSpPr>
-        <p:spPr>
-          <a:xfrm flipH="1">
-            <a:off x="6093934" y="1564919"/>
-            <a:ext cx="1766038" cy="1675037"/>
-          </a:xfrm>
-          <a:prstGeom prst="line">
-            <a:avLst/>
-          </a:prstGeom>
-          <a:ln w="0">
-            <a:solidFill>
-              <a:srgbClr val="000000"/>
-            </a:solidFill>
-            <a:tailEnd type="none" w="med" len="med"/>
-          </a:ln>
-        </p:spPr>
-        <p:style>
-          <a:lnRef idx="0">
-            <a:scrgbClr r="0" g="0" b="0"/>
-          </a:lnRef>
-          <a:fillRef idx="0">
-            <a:scrgbClr r="0" g="0" b="0"/>
-          </a:fillRef>
-          <a:effectRef idx="0">
-            <a:scrgbClr r="0" g="0" b="0"/>
-          </a:effectRef>
-          <a:fontRef idx="minor"/>
-        </p:style>
-        <p:txBody>
-          <a:bodyPr/>
-          <a:lstStyle/>
-          <a:p>
-            <a:endParaRPr lang="en-US"/>
-          </a:p>
-        </p:txBody>
-      </p:sp>
-      <p:sp>
-        <p:nvSpPr>
-          <p:cNvPr id="13" name="Line 4">
-            <a:extLst>
-              <a:ext uri="{FF2B5EF4-FFF2-40B4-BE49-F238E27FC236}">
-                <a16:creationId xmlns:a16="http://schemas.microsoft.com/office/drawing/2014/main" id="{224019EC-586B-1E99-A034-224F518AF74D}"/>
-              </a:ext>
-            </a:extLst>
-          </p:cNvPr>
-          <p:cNvSpPr/>
-          <p:nvPr/>
-        </p:nvSpPr>
-        <p:spPr>
-          <a:xfrm flipV="1">
-            <a:off x="7868745" y="1543421"/>
-            <a:ext cx="2268671" cy="14628"/>
-          </a:xfrm>
-          <a:prstGeom prst="line">
-            <a:avLst/>
-          </a:prstGeom>
-          <a:ln w="0">
-            <a:solidFill>
-              <a:srgbClr val="000000"/>
-            </a:solidFill>
-            <a:tailEnd type="none" w="med" len="med"/>
-          </a:ln>
-        </p:spPr>
-        <p:style>
-          <a:lnRef idx="0">
-            <a:scrgbClr r="0" g="0" b="0"/>
-          </a:lnRef>
-          <a:fillRef idx="0">
-            <a:scrgbClr r="0" g="0" b="0"/>
-          </a:fillRef>
-          <a:effectRef idx="0">
-            <a:scrgbClr r="0" g="0" b="0"/>
-          </a:effectRef>
-          <a:fontRef idx="minor"/>
-        </p:style>
-        <p:txBody>
-          <a:bodyPr/>
-          <a:lstStyle/>
-          <a:p>
-            <a:endParaRPr lang="en-US"/>
-          </a:p>
-        </p:txBody>
-      </p:sp>
-      <p:sp>
-        <p:nvSpPr>
-          <p:cNvPr id="19" name="Line 6">
-            <a:extLst>
-              <a:ext uri="{FF2B5EF4-FFF2-40B4-BE49-F238E27FC236}">
-                <a16:creationId xmlns:a16="http://schemas.microsoft.com/office/drawing/2014/main" id="{1E6D1E62-0390-DC27-647B-AD2FD0F4A7B6}"/>
-              </a:ext>
-            </a:extLst>
-          </p:cNvPr>
-          <p:cNvSpPr/>
-          <p:nvPr/>
-        </p:nvSpPr>
-        <p:spPr>
-          <a:xfrm flipH="1">
-            <a:off x="8432287" y="3740835"/>
-            <a:ext cx="1724623" cy="1715926"/>
-          </a:xfrm>
-          <a:prstGeom prst="line">
-            <a:avLst/>
-          </a:prstGeom>
-          <a:ln w="0">
-            <a:solidFill>
-              <a:srgbClr val="000000"/>
-            </a:solidFill>
-            <a:tailEnd type="none" w="med" len="med"/>
-          </a:ln>
-        </p:spPr>
-        <p:style>
-          <a:lnRef idx="0">
-            <a:scrgbClr r="0" g="0" b="0"/>
-          </a:lnRef>
-          <a:fillRef idx="0">
-            <a:scrgbClr r="0" g="0" b="0"/>
-          </a:fillRef>
-          <a:effectRef idx="0">
-            <a:scrgbClr r="0" g="0" b="0"/>
-          </a:effectRef>
-          <a:fontRef idx="minor"/>
-        </p:style>
-        <p:txBody>
-          <a:bodyPr/>
-          <a:lstStyle/>
-          <a:p>
-            <a:endParaRPr lang="en-US"/>
-          </a:p>
-        </p:txBody>
-      </p:sp>
-      <p:sp>
-        <p:nvSpPr>
-          <p:cNvPr id="20" name="Line 6">
-            <a:extLst>
-              <a:ext uri="{FF2B5EF4-FFF2-40B4-BE49-F238E27FC236}">
-                <a16:creationId xmlns:a16="http://schemas.microsoft.com/office/drawing/2014/main" id="{734FC62D-3318-9F72-4265-0136235FDA91}"/>
-              </a:ext>
-            </a:extLst>
-          </p:cNvPr>
-          <p:cNvSpPr/>
-          <p:nvPr/>
-        </p:nvSpPr>
-        <p:spPr>
-          <a:xfrm flipH="1">
-            <a:off x="8392524" y="1543421"/>
-            <a:ext cx="1744893" cy="1696537"/>
-          </a:xfrm>
-          <a:prstGeom prst="line">
-            <a:avLst/>
-          </a:prstGeom>
-          <a:ln w="0">
-            <a:solidFill>
-              <a:srgbClr val="000000"/>
-            </a:solidFill>
-            <a:tailEnd type="none" w="med" len="med"/>
-          </a:ln>
-        </p:spPr>
-        <p:style>
-          <a:lnRef idx="0">
-            <a:scrgbClr r="0" g="0" b="0"/>
-          </a:lnRef>
-          <a:fillRef idx="0">
-            <a:scrgbClr r="0" g="0" b="0"/>
-          </a:fillRef>
-          <a:effectRef idx="0">
-            <a:scrgbClr r="0" g="0" b="0"/>
-          </a:effectRef>
-          <a:fontRef idx="minor"/>
-        </p:style>
-        <p:txBody>
-          <a:bodyPr/>
-          <a:lstStyle/>
-          <a:p>
-            <a:endParaRPr lang="en-US"/>
-          </a:p>
-        </p:txBody>
-      </p:sp>
-      <p:sp>
-        <p:nvSpPr>
-          <p:cNvPr id="27" name="Line 5">
-            <a:extLst>
-              <a:ext uri="{FF2B5EF4-FFF2-40B4-BE49-F238E27FC236}">
-                <a16:creationId xmlns:a16="http://schemas.microsoft.com/office/drawing/2014/main" id="{5EFD8680-9FCF-54DC-BB53-EFA1CDAE1D96}"/>
-              </a:ext>
-            </a:extLst>
-          </p:cNvPr>
-          <p:cNvSpPr/>
-          <p:nvPr/>
-        </p:nvSpPr>
-        <p:spPr>
-          <a:xfrm flipH="1" flipV="1">
-            <a:off x="10137420" y="1544248"/>
-            <a:ext cx="29566" cy="2197414"/>
-          </a:xfrm>
-          <a:prstGeom prst="line">
-            <a:avLst/>
-          </a:prstGeom>
-          <a:ln w="0">
-            <a:solidFill>
-              <a:srgbClr val="000000"/>
-            </a:solidFill>
-            <a:tailEnd type="none" w="med" len="med"/>
-          </a:ln>
-        </p:spPr>
-        <p:style>
-          <a:lnRef idx="0">
-            <a:scrgbClr r="0" g="0" b="0"/>
-          </a:lnRef>
-          <a:fillRef idx="0">
-            <a:scrgbClr r="0" g="0" b="0"/>
-          </a:fillRef>
-          <a:effectRef idx="0">
-            <a:scrgbClr r="0" g="0" b="0"/>
-          </a:effectRef>
-          <a:fontRef idx="minor"/>
-        </p:style>
-        <p:txBody>
-          <a:bodyPr/>
-          <a:lstStyle/>
-          <a:p>
-            <a:endParaRPr lang="en-US"/>
-          </a:p>
-        </p:txBody>
-      </p:sp>
-      <p:sp>
-        <p:nvSpPr>
-          <p:cNvPr id="28" name="Line 4">
-            <a:extLst>
-              <a:ext uri="{FF2B5EF4-FFF2-40B4-BE49-F238E27FC236}">
-                <a16:creationId xmlns:a16="http://schemas.microsoft.com/office/drawing/2014/main" id="{4F6E8361-3726-6096-757E-39A9A80132A5}"/>
-              </a:ext>
-            </a:extLst>
-          </p:cNvPr>
-          <p:cNvSpPr/>
-          <p:nvPr/>
-        </p:nvSpPr>
-        <p:spPr>
-          <a:xfrm>
-            <a:off x="6096000" y="3232850"/>
-            <a:ext cx="2304000" cy="0"/>
-          </a:xfrm>
-          <a:prstGeom prst="line">
-            <a:avLst/>
-          </a:prstGeom>
-          <a:ln w="0">
-            <a:solidFill>
-              <a:srgbClr val="000000"/>
-            </a:solidFill>
-            <a:tailEnd type="none" w="med" len="med"/>
-          </a:ln>
-        </p:spPr>
-        <p:style>
-          <a:lnRef idx="0">
-            <a:scrgbClr r="0" g="0" b="0"/>
-          </a:lnRef>
-          <a:fillRef idx="0">
-            <a:scrgbClr r="0" g="0" b="0"/>
-          </a:fillRef>
-          <a:effectRef idx="0">
-            <a:scrgbClr r="0" g="0" b="0"/>
-          </a:effectRef>
-          <a:fontRef idx="minor"/>
-        </p:style>
-        <p:txBody>
-          <a:bodyPr/>
-          <a:lstStyle/>
-          <a:p>
-            <a:endParaRPr lang="en-US"/>
-          </a:p>
-        </p:txBody>
-      </p:sp>
-      <p:sp>
-        <p:nvSpPr>
-          <p:cNvPr id="29" name="Line 4">
-            <a:extLst>
-              <a:ext uri="{FF2B5EF4-FFF2-40B4-BE49-F238E27FC236}">
-                <a16:creationId xmlns:a16="http://schemas.microsoft.com/office/drawing/2014/main" id="{4305790B-2085-E23A-E5F6-269196F4C79B}"/>
-              </a:ext>
-            </a:extLst>
-          </p:cNvPr>
-          <p:cNvSpPr/>
-          <p:nvPr/>
-        </p:nvSpPr>
-        <p:spPr>
-          <a:xfrm>
-            <a:off x="6093934" y="5468516"/>
-            <a:ext cx="2341507" cy="0"/>
-          </a:xfrm>
-          <a:prstGeom prst="line">
-            <a:avLst/>
-          </a:prstGeom>
-          <a:ln w="0">
-            <a:solidFill>
-              <a:srgbClr val="000000"/>
-            </a:solidFill>
-            <a:tailEnd type="none" w="med" len="med"/>
-          </a:ln>
-        </p:spPr>
-        <p:style>
-          <a:lnRef idx="0">
-            <a:scrgbClr r="0" g="0" b="0"/>
-          </a:lnRef>
-          <a:fillRef idx="0">
-            <a:scrgbClr r="0" g="0" b="0"/>
-          </a:fillRef>
-          <a:effectRef idx="0">
-            <a:scrgbClr r="0" g="0" b="0"/>
-          </a:effectRef>
-          <a:fontRef idx="minor"/>
-        </p:style>
-        <p:txBody>
-          <a:bodyPr/>
-          <a:lstStyle/>
-          <a:p>
-            <a:endParaRPr lang="en-US"/>
-          </a:p>
-        </p:txBody>
-      </p:sp>
-      <p:sp>
-        <p:nvSpPr>
-          <p:cNvPr id="30" name="Line 5">
-            <a:extLst>
-              <a:ext uri="{FF2B5EF4-FFF2-40B4-BE49-F238E27FC236}">
-                <a16:creationId xmlns:a16="http://schemas.microsoft.com/office/drawing/2014/main" id="{16969A89-E8D2-DD52-4429-001DC3F7C125}"/>
-              </a:ext>
-            </a:extLst>
-          </p:cNvPr>
-          <p:cNvSpPr/>
-          <p:nvPr/>
-        </p:nvSpPr>
-        <p:spPr>
-          <a:xfrm flipH="1" flipV="1">
-            <a:off x="6095592" y="3239958"/>
-            <a:ext cx="22474" cy="2228558"/>
-          </a:xfrm>
-          <a:prstGeom prst="line">
-            <a:avLst/>
-          </a:prstGeom>
-          <a:ln w="0">
-            <a:solidFill>
-              <a:srgbClr val="000000"/>
-            </a:solidFill>
-            <a:tailEnd type="none" w="med" len="med"/>
-          </a:ln>
-        </p:spPr>
-        <p:style>
-          <a:lnRef idx="0">
-            <a:scrgbClr r="0" g="0" b="0"/>
-          </a:lnRef>
-          <a:fillRef idx="0">
-            <a:scrgbClr r="0" g="0" b="0"/>
-          </a:fillRef>
-          <a:effectRef idx="0">
-            <a:scrgbClr r="0" g="0" b="0"/>
-          </a:effectRef>
-          <a:fontRef idx="minor"/>
-        </p:style>
-        <p:txBody>
-          <a:bodyPr/>
-          <a:lstStyle/>
-          <a:p>
-            <a:endParaRPr lang="en-US"/>
-          </a:p>
-        </p:txBody>
-      </p:sp>
-      <p:sp>
-        <p:nvSpPr>
-          <p:cNvPr id="31" name="Line 5">
-            <a:extLst>
-              <a:ext uri="{FF2B5EF4-FFF2-40B4-BE49-F238E27FC236}">
-                <a16:creationId xmlns:a16="http://schemas.microsoft.com/office/drawing/2014/main" id="{1A50676E-4926-26DA-A3E8-30B26102517D}"/>
-              </a:ext>
-            </a:extLst>
-          </p:cNvPr>
-          <p:cNvSpPr/>
-          <p:nvPr/>
-        </p:nvSpPr>
-        <p:spPr>
-          <a:xfrm flipH="1" flipV="1">
-            <a:off x="8406680" y="3232850"/>
-            <a:ext cx="25608" cy="2235666"/>
-          </a:xfrm>
-          <a:prstGeom prst="line">
-            <a:avLst/>
-          </a:prstGeom>
-          <a:ln w="0">
-            <a:solidFill>
-              <a:srgbClr val="000000"/>
-            </a:solidFill>
-            <a:tailEnd type="none" w="med" len="med"/>
           </a:ln>
         </p:spPr>
         <p:style>
@@ -17523,7 +17523,7 @@
               <a:alpha val="17115"/>
             </a:schemeClr>
           </a:solidFill>
-          <a:ln>
+          <a:ln w="12700">
             <a:solidFill>
               <a:schemeClr val="tx1"/>
             </a:solidFill>
@@ -17760,683 +17760,6 @@
       </p:sp>
       <p:sp>
         <p:nvSpPr>
-          <p:cNvPr id="739" name="Line 4">
-            <a:extLst>
-              <a:ext uri="{FF2B5EF4-FFF2-40B4-BE49-F238E27FC236}">
-                <a16:creationId xmlns:a16="http://schemas.microsoft.com/office/drawing/2014/main" id="{61A071A2-ECAB-0B58-695A-365EACE50FAF}"/>
-              </a:ext>
-            </a:extLst>
-          </p:cNvPr>
-          <p:cNvSpPr/>
-          <p:nvPr/>
-        </p:nvSpPr>
-        <p:spPr>
-          <a:xfrm>
-            <a:off x="7860000" y="3744000"/>
-            <a:ext cx="2304000" cy="0"/>
-          </a:xfrm>
-          <a:prstGeom prst="line">
-            <a:avLst/>
-          </a:prstGeom>
-          <a:ln w="0">
-            <a:solidFill>
-              <a:srgbClr val="000000"/>
-            </a:solidFill>
-            <a:tailEnd type="none" w="med" len="med"/>
-          </a:ln>
-        </p:spPr>
-        <p:style>
-          <a:lnRef idx="0">
-            <a:scrgbClr r="0" g="0" b="0"/>
-          </a:lnRef>
-          <a:fillRef idx="0">
-            <a:scrgbClr r="0" g="0" b="0"/>
-          </a:fillRef>
-          <a:effectRef idx="0">
-            <a:scrgbClr r="0" g="0" b="0"/>
-          </a:effectRef>
-          <a:fontRef idx="minor"/>
-        </p:style>
-        <p:txBody>
-          <a:bodyPr/>
-          <a:lstStyle/>
-          <a:p>
-            <a:endParaRPr lang="en-US"/>
-          </a:p>
-        </p:txBody>
-      </p:sp>
-      <p:sp>
-        <p:nvSpPr>
-          <p:cNvPr id="740" name="Line 5">
-            <a:extLst>
-              <a:ext uri="{FF2B5EF4-FFF2-40B4-BE49-F238E27FC236}">
-                <a16:creationId xmlns:a16="http://schemas.microsoft.com/office/drawing/2014/main" id="{AFCA4C48-8F42-5701-2671-94DF094B1778}"/>
-              </a:ext>
-            </a:extLst>
-          </p:cNvPr>
-          <p:cNvSpPr/>
-          <p:nvPr/>
-        </p:nvSpPr>
-        <p:spPr>
-          <a:xfrm flipV="1">
-            <a:off x="7859999" y="1558050"/>
-            <a:ext cx="8747" cy="2185949"/>
-          </a:xfrm>
-          <a:prstGeom prst="line">
-            <a:avLst/>
-          </a:prstGeom>
-          <a:ln w="0">
-            <a:solidFill>
-              <a:srgbClr val="000000"/>
-            </a:solidFill>
-            <a:tailEnd type="none" w="med" len="med"/>
-          </a:ln>
-        </p:spPr>
-        <p:style>
-          <a:lnRef idx="0">
-            <a:scrgbClr r="0" g="0" b="0"/>
-          </a:lnRef>
-          <a:fillRef idx="0">
-            <a:scrgbClr r="0" g="0" b="0"/>
-          </a:fillRef>
-          <a:effectRef idx="0">
-            <a:scrgbClr r="0" g="0" b="0"/>
-          </a:effectRef>
-          <a:fontRef idx="minor"/>
-        </p:style>
-        <p:txBody>
-          <a:bodyPr/>
-          <a:lstStyle/>
-          <a:p>
-            <a:endParaRPr lang="en-US"/>
-          </a:p>
-        </p:txBody>
-      </p:sp>
-      <p:sp>
-        <p:nvSpPr>
-          <p:cNvPr id="741" name="Line 6">
-            <a:extLst>
-              <a:ext uri="{FF2B5EF4-FFF2-40B4-BE49-F238E27FC236}">
-                <a16:creationId xmlns:a16="http://schemas.microsoft.com/office/drawing/2014/main" id="{2DCB7AE5-F7D3-478C-4C0C-F1DDA1DF2BB8}"/>
-              </a:ext>
-            </a:extLst>
-          </p:cNvPr>
-          <p:cNvSpPr/>
-          <p:nvPr/>
-        </p:nvSpPr>
-        <p:spPr>
-          <a:xfrm flipH="1">
-            <a:off x="6118066" y="3744000"/>
-            <a:ext cx="1741934" cy="1712761"/>
-          </a:xfrm>
-          <a:prstGeom prst="line">
-            <a:avLst/>
-          </a:prstGeom>
-          <a:ln w="0">
-            <a:solidFill>
-              <a:srgbClr val="000000"/>
-            </a:solidFill>
-            <a:tailEnd type="none" w="med" len="med"/>
-          </a:ln>
-        </p:spPr>
-        <p:style>
-          <a:lnRef idx="0">
-            <a:scrgbClr r="0" g="0" b="0"/>
-          </a:lnRef>
-          <a:fillRef idx="0">
-            <a:scrgbClr r="0" g="0" b="0"/>
-          </a:fillRef>
-          <a:effectRef idx="0">
-            <a:scrgbClr r="0" g="0" b="0"/>
-          </a:effectRef>
-          <a:fontRef idx="minor"/>
-        </p:style>
-        <p:txBody>
-          <a:bodyPr/>
-          <a:lstStyle/>
-          <a:p>
-            <a:endParaRPr lang="en-US"/>
-          </a:p>
-        </p:txBody>
-      </p:sp>
-      <p:sp>
-        <p:nvSpPr>
-          <p:cNvPr id="742" name="CustomShape 7">
-            <a:extLst>
-              <a:ext uri="{FF2B5EF4-FFF2-40B4-BE49-F238E27FC236}">
-                <a16:creationId xmlns:a16="http://schemas.microsoft.com/office/drawing/2014/main" id="{DA9CC694-2225-E58D-EFE9-E6A826454AB7}"/>
-              </a:ext>
-            </a:extLst>
-          </p:cNvPr>
-          <p:cNvSpPr/>
-          <p:nvPr/>
-        </p:nvSpPr>
-        <p:spPr>
-          <a:xfrm>
-            <a:off x="6349080" y="4933080"/>
-            <a:ext cx="360000" cy="360000"/>
-          </a:xfrm>
-          <a:prstGeom prst="ellipse">
-            <a:avLst/>
-          </a:prstGeom>
-          <a:solidFill>
-            <a:srgbClr val="729FCF"/>
-          </a:solidFill>
-          <a:ln w="0">
-            <a:solidFill>
-              <a:srgbClr val="3465A4"/>
-            </a:solidFill>
-          </a:ln>
-        </p:spPr>
-        <p:style>
-          <a:lnRef idx="0">
-            <a:scrgbClr r="0" g="0" b="0"/>
-          </a:lnRef>
-          <a:fillRef idx="0">
-            <a:scrgbClr r="0" g="0" b="0"/>
-          </a:fillRef>
-          <a:effectRef idx="0">
-            <a:scrgbClr r="0" g="0" b="0"/>
-          </a:effectRef>
-          <a:fontRef idx="minor"/>
-        </p:style>
-        <p:txBody>
-          <a:bodyPr/>
-          <a:lstStyle/>
-          <a:p>
-            <a:endParaRPr lang="en-US"/>
-          </a:p>
-        </p:txBody>
-      </p:sp>
-      <p:sp>
-        <p:nvSpPr>
-          <p:cNvPr id="745" name="Line 10">
-            <a:extLst>
-              <a:ext uri="{FF2B5EF4-FFF2-40B4-BE49-F238E27FC236}">
-                <a16:creationId xmlns:a16="http://schemas.microsoft.com/office/drawing/2014/main" id="{400028E4-132F-D53B-B138-AE429AF709DD}"/>
-              </a:ext>
-            </a:extLst>
-          </p:cNvPr>
-          <p:cNvSpPr/>
-          <p:nvPr/>
-        </p:nvSpPr>
-        <p:spPr>
-          <a:xfrm>
-            <a:off x="7320000" y="4320000"/>
-            <a:ext cx="1080000" cy="0"/>
-          </a:xfrm>
-          <a:prstGeom prst="line">
-            <a:avLst/>
-          </a:prstGeom>
-          <a:ln w="36000">
-            <a:solidFill>
-              <a:schemeClr val="accent6"/>
-            </a:solidFill>
-            <a:custDash>
-              <a:ds d="197000" sp="127000"/>
-            </a:custDash>
-            <a:round/>
-          </a:ln>
-        </p:spPr>
-        <p:style>
-          <a:lnRef idx="0">
-            <a:scrgbClr r="0" g="0" b="0"/>
-          </a:lnRef>
-          <a:fillRef idx="0">
-            <a:scrgbClr r="0" g="0" b="0"/>
-          </a:fillRef>
-          <a:effectRef idx="0">
-            <a:scrgbClr r="0" g="0" b="0"/>
-          </a:effectRef>
-          <a:fontRef idx="minor"/>
-        </p:style>
-        <p:txBody>
-          <a:bodyPr/>
-          <a:lstStyle/>
-          <a:p>
-            <a:endParaRPr lang="en-US"/>
-          </a:p>
-        </p:txBody>
-      </p:sp>
-      <p:sp>
-        <p:nvSpPr>
-          <p:cNvPr id="746" name="Line 11">
-            <a:extLst>
-              <a:ext uri="{FF2B5EF4-FFF2-40B4-BE49-F238E27FC236}">
-                <a16:creationId xmlns:a16="http://schemas.microsoft.com/office/drawing/2014/main" id="{FB91F6F2-245D-BAE4-E64F-E01635C14BBA}"/>
-              </a:ext>
-            </a:extLst>
-          </p:cNvPr>
-          <p:cNvSpPr/>
-          <p:nvPr/>
-        </p:nvSpPr>
-        <p:spPr>
-          <a:xfrm flipV="1">
-            <a:off x="8616000" y="3744000"/>
-            <a:ext cx="468000" cy="504000"/>
-          </a:xfrm>
-          <a:prstGeom prst="line">
-            <a:avLst/>
-          </a:prstGeom>
-          <a:ln w="36000">
-            <a:solidFill>
-              <a:schemeClr val="accent6"/>
-            </a:solidFill>
-            <a:custDash>
-              <a:ds d="197000" sp="127000"/>
-            </a:custDash>
-            <a:round/>
-          </a:ln>
-        </p:spPr>
-        <p:style>
-          <a:lnRef idx="0">
-            <a:scrgbClr r="0" g="0" b="0"/>
-          </a:lnRef>
-          <a:fillRef idx="0">
-            <a:scrgbClr r="0" g="0" b="0"/>
-          </a:fillRef>
-          <a:effectRef idx="0">
-            <a:scrgbClr r="0" g="0" b="0"/>
-          </a:effectRef>
-          <a:fontRef idx="minor"/>
-        </p:style>
-        <p:txBody>
-          <a:bodyPr/>
-          <a:lstStyle/>
-          <a:p>
-            <a:endParaRPr lang="en-US"/>
-          </a:p>
-        </p:txBody>
-      </p:sp>
-      <p:sp>
-        <p:nvSpPr>
-          <p:cNvPr id="747" name="CustomShape 12">
-            <a:extLst>
-              <a:ext uri="{FF2B5EF4-FFF2-40B4-BE49-F238E27FC236}">
-                <a16:creationId xmlns:a16="http://schemas.microsoft.com/office/drawing/2014/main" id="{C9194492-82E3-076B-87A7-8BB02BEDCF23}"/>
-              </a:ext>
-            </a:extLst>
-          </p:cNvPr>
-          <p:cNvSpPr/>
-          <p:nvPr/>
-        </p:nvSpPr>
-        <p:spPr>
-          <a:xfrm>
-            <a:off x="8328000" y="4176000"/>
-            <a:ext cx="360000" cy="360000"/>
-          </a:xfrm>
-          <a:prstGeom prst="ellipse">
-            <a:avLst/>
-          </a:prstGeom>
-          <a:solidFill>
-            <a:srgbClr val="729FCF"/>
-          </a:solidFill>
-          <a:ln w="0">
-            <a:solidFill>
-              <a:srgbClr val="3465A4"/>
-            </a:solidFill>
-          </a:ln>
-        </p:spPr>
-        <p:style>
-          <a:lnRef idx="0">
-            <a:scrgbClr r="0" g="0" b="0"/>
-          </a:lnRef>
-          <a:fillRef idx="0">
-            <a:scrgbClr r="0" g="0" b="0"/>
-          </a:fillRef>
-          <a:effectRef idx="0">
-            <a:scrgbClr r="0" g="0" b="0"/>
-          </a:effectRef>
-          <a:fontRef idx="minor"/>
-        </p:style>
-        <p:txBody>
-          <a:bodyPr/>
-          <a:lstStyle/>
-          <a:p>
-            <a:endParaRPr lang="en-US"/>
-          </a:p>
-        </p:txBody>
-      </p:sp>
-      <p:sp>
-        <p:nvSpPr>
-          <p:cNvPr id="748" name="CustomShape 13">
-            <a:extLst>
-              <a:ext uri="{FF2B5EF4-FFF2-40B4-BE49-F238E27FC236}">
-                <a16:creationId xmlns:a16="http://schemas.microsoft.com/office/drawing/2014/main" id="{E33AE228-A357-F5C8-A3A5-4F7814120120}"/>
-              </a:ext>
-            </a:extLst>
-          </p:cNvPr>
-          <p:cNvSpPr/>
-          <p:nvPr/>
-        </p:nvSpPr>
-        <p:spPr>
-          <a:xfrm>
-            <a:off x="7104720" y="4140720"/>
-            <a:ext cx="360000" cy="360000"/>
-          </a:xfrm>
-          <a:prstGeom prst="ellipse">
-            <a:avLst/>
-          </a:prstGeom>
-          <a:solidFill>
-            <a:srgbClr val="729FCF"/>
-          </a:solidFill>
-          <a:ln w="0">
-            <a:solidFill>
-              <a:srgbClr val="3465A4"/>
-            </a:solidFill>
-          </a:ln>
-        </p:spPr>
-        <p:style>
-          <a:lnRef idx="0">
-            <a:scrgbClr r="0" g="0" b="0"/>
-          </a:lnRef>
-          <a:fillRef idx="0">
-            <a:scrgbClr r="0" g="0" b="0"/>
-          </a:fillRef>
-          <a:effectRef idx="0">
-            <a:scrgbClr r="0" g="0" b="0"/>
-          </a:effectRef>
-          <a:fontRef idx="minor"/>
-        </p:style>
-        <p:txBody>
-          <a:bodyPr/>
-          <a:lstStyle/>
-          <a:p>
-            <a:endParaRPr lang="en-US"/>
-          </a:p>
-        </p:txBody>
-      </p:sp>
-      <p:sp>
-        <p:nvSpPr>
-          <p:cNvPr id="750" name="TextShape 15">
-            <a:extLst>
-              <a:ext uri="{FF2B5EF4-FFF2-40B4-BE49-F238E27FC236}">
-                <a16:creationId xmlns:a16="http://schemas.microsoft.com/office/drawing/2014/main" id="{83555EF0-1C7A-653C-1A5A-92FC32112AE5}"/>
-              </a:ext>
-            </a:extLst>
-          </p:cNvPr>
-          <p:cNvSpPr txBox="1"/>
-          <p:nvPr/>
-        </p:nvSpPr>
-        <p:spPr>
-          <a:xfrm>
-            <a:off x="7068000" y="1332000"/>
-            <a:ext cx="814680" cy="290160"/>
-          </a:xfrm>
-          <a:prstGeom prst="rect">
-            <a:avLst/>
-          </a:prstGeom>
-          <a:noFill/>
-          <a:ln w="0">
-            <a:noFill/>
-          </a:ln>
-        </p:spPr>
-        <p:txBody>
-          <a:bodyPr lIns="90000" tIns="45000" rIns="90000" bIns="45000">
-            <a:noAutofit/>
-          </a:bodyPr>
-          <a:lstStyle/>
-          <a:p>
-            <a:r>
-              <a:rPr lang="en-GB" sz="1400" b="1" i="1" spc="-1" dirty="0">
-                <a:latin typeface="Arial"/>
-              </a:rPr>
-              <a:t>loved</a:t>
-            </a:r>
-            <a:endParaRPr lang="en-GB" sz="1400" spc="-1" dirty="0">
-              <a:latin typeface="Arial"/>
-            </a:endParaRPr>
-          </a:p>
-        </p:txBody>
-      </p:sp>
-      <p:sp>
-        <p:nvSpPr>
-          <p:cNvPr id="751" name="TextShape 16">
-            <a:extLst>
-              <a:ext uri="{FF2B5EF4-FFF2-40B4-BE49-F238E27FC236}">
-                <a16:creationId xmlns:a16="http://schemas.microsoft.com/office/drawing/2014/main" id="{BE54A97A-1D4A-A22A-855C-888C522B8EE4}"/>
-              </a:ext>
-            </a:extLst>
-          </p:cNvPr>
-          <p:cNvSpPr txBox="1"/>
-          <p:nvPr/>
-        </p:nvSpPr>
-        <p:spPr>
-          <a:xfrm>
-            <a:off x="9732360" y="3744000"/>
-            <a:ext cx="953280" cy="290160"/>
-          </a:xfrm>
-          <a:prstGeom prst="rect">
-            <a:avLst/>
-          </a:prstGeom>
-          <a:noFill/>
-          <a:ln w="0">
-            <a:noFill/>
-          </a:ln>
-        </p:spPr>
-        <p:txBody>
-          <a:bodyPr lIns="90000" tIns="45000" rIns="90000" bIns="45000">
-            <a:noAutofit/>
-          </a:bodyPr>
-          <a:lstStyle/>
-          <a:p>
-            <a:r>
-              <a:rPr lang="en-GB" sz="1400" b="1" i="1" spc="-1" dirty="0">
-                <a:latin typeface="Arial"/>
-              </a:rPr>
-              <a:t>amazing</a:t>
-            </a:r>
-            <a:endParaRPr lang="en-GB" sz="1400" spc="-1" dirty="0">
-              <a:latin typeface="Arial"/>
-            </a:endParaRPr>
-          </a:p>
-        </p:txBody>
-      </p:sp>
-      <p:sp>
-        <p:nvSpPr>
-          <p:cNvPr id="752" name="TextShape 17">
-            <a:extLst>
-              <a:ext uri="{FF2B5EF4-FFF2-40B4-BE49-F238E27FC236}">
-                <a16:creationId xmlns:a16="http://schemas.microsoft.com/office/drawing/2014/main" id="{2086A025-3EC4-BF83-D5C0-CC844F9A3285}"/>
-              </a:ext>
-            </a:extLst>
-          </p:cNvPr>
-          <p:cNvSpPr txBox="1"/>
-          <p:nvPr/>
-        </p:nvSpPr>
-        <p:spPr>
-          <a:xfrm>
-            <a:off x="5394360" y="5292000"/>
-            <a:ext cx="816120" cy="290160"/>
-          </a:xfrm>
-          <a:prstGeom prst="rect">
-            <a:avLst/>
-          </a:prstGeom>
-          <a:noFill/>
-          <a:ln w="0">
-            <a:noFill/>
-          </a:ln>
-        </p:spPr>
-        <p:txBody>
-          <a:bodyPr lIns="90000" tIns="45000" rIns="90000" bIns="45000">
-            <a:noAutofit/>
-          </a:bodyPr>
-          <a:lstStyle/>
-          <a:p>
-            <a:r>
-              <a:rPr lang="en-GB" sz="1400" b="1" i="1" spc="-1" dirty="0">
-                <a:latin typeface="Arial"/>
-              </a:rPr>
-              <a:t>hated</a:t>
-            </a:r>
-            <a:endParaRPr lang="en-GB" sz="1400" spc="-1" dirty="0">
-              <a:latin typeface="Arial"/>
-            </a:endParaRPr>
-          </a:p>
-        </p:txBody>
-      </p:sp>
-      <p:sp>
-        <p:nvSpPr>
-          <p:cNvPr id="757" name="TextShape 22">
-            <a:extLst>
-              <a:ext uri="{FF2B5EF4-FFF2-40B4-BE49-F238E27FC236}">
-                <a16:creationId xmlns:a16="http://schemas.microsoft.com/office/drawing/2014/main" id="{F3489D5A-0080-B741-19BC-EE1E5E96E4B5}"/>
-              </a:ext>
-            </a:extLst>
-          </p:cNvPr>
-          <p:cNvSpPr txBox="1"/>
-          <p:nvPr/>
-        </p:nvSpPr>
-        <p:spPr>
-          <a:xfrm>
-            <a:off x="8696640" y="4284000"/>
-            <a:ext cx="1361760" cy="489960"/>
-          </a:xfrm>
-          <a:prstGeom prst="rect">
-            <a:avLst/>
-          </a:prstGeom>
-          <a:noFill/>
-          <a:ln w="0">
-            <a:noFill/>
-          </a:ln>
-        </p:spPr>
-        <p:txBody>
-          <a:bodyPr lIns="90000" tIns="45000" rIns="90000" bIns="45000">
-            <a:noAutofit/>
-          </a:bodyPr>
-          <a:lstStyle/>
-          <a:p>
-            <a:r>
-              <a:rPr lang="en-GB" sz="1400" spc="-1" dirty="0">
-                <a:latin typeface="Arial"/>
-              </a:rPr>
-              <a:t>amazing how much I hated this</a:t>
-            </a:r>
-          </a:p>
-        </p:txBody>
-      </p:sp>
-      <p:sp>
-        <p:nvSpPr>
-          <p:cNvPr id="758" name="TextShape 23">
-            <a:extLst>
-              <a:ext uri="{FF2B5EF4-FFF2-40B4-BE49-F238E27FC236}">
-                <a16:creationId xmlns:a16="http://schemas.microsoft.com/office/drawing/2014/main" id="{74E3A0C3-F2C8-305D-31E1-D9440C84AABB}"/>
-              </a:ext>
-            </a:extLst>
-          </p:cNvPr>
-          <p:cNvSpPr txBox="1"/>
-          <p:nvPr/>
-        </p:nvSpPr>
-        <p:spPr>
-          <a:xfrm>
-            <a:off x="7111402" y="4477680"/>
-            <a:ext cx="953280" cy="489960"/>
-          </a:xfrm>
-          <a:prstGeom prst="rect">
-            <a:avLst/>
-          </a:prstGeom>
-          <a:noFill/>
-          <a:ln w="0">
-            <a:noFill/>
-          </a:ln>
-        </p:spPr>
-        <p:txBody>
-          <a:bodyPr lIns="90000" tIns="45000" rIns="90000" bIns="45000">
-            <a:noAutofit/>
-          </a:bodyPr>
-          <a:lstStyle/>
-          <a:p>
-            <a:r>
-              <a:rPr lang="en-GB" sz="1400" spc="-1" dirty="0">
-                <a:latin typeface="Arial"/>
-              </a:rPr>
-              <a:t>hated this movie</a:t>
-            </a:r>
-          </a:p>
-        </p:txBody>
-      </p:sp>
-      <p:sp>
-        <p:nvSpPr>
-          <p:cNvPr id="759" name="TextShape 24">
-            <a:extLst>
-              <a:ext uri="{FF2B5EF4-FFF2-40B4-BE49-F238E27FC236}">
-                <a16:creationId xmlns:a16="http://schemas.microsoft.com/office/drawing/2014/main" id="{F0DF7ECB-5877-D9A7-7756-190C8BFA8D9D}"/>
-              </a:ext>
-            </a:extLst>
-          </p:cNvPr>
-          <p:cNvSpPr txBox="1"/>
-          <p:nvPr/>
-        </p:nvSpPr>
-        <p:spPr>
-          <a:xfrm>
-            <a:off x="9265296" y="2348460"/>
-            <a:ext cx="1159474" cy="489960"/>
-          </a:xfrm>
-          <a:prstGeom prst="rect">
-            <a:avLst/>
-          </a:prstGeom>
-          <a:noFill/>
-          <a:ln w="0">
-            <a:noFill/>
-          </a:ln>
-        </p:spPr>
-        <p:txBody>
-          <a:bodyPr lIns="90000" tIns="45000" rIns="90000" bIns="45000">
-            <a:noAutofit/>
-          </a:bodyPr>
-          <a:lstStyle/>
-          <a:p>
-            <a:r>
-              <a:rPr lang="en-GB" sz="1400" spc="-1" dirty="0">
-                <a:latin typeface="Arial"/>
-              </a:rPr>
-              <a:t>loved this amazing movie</a:t>
-            </a:r>
-          </a:p>
-        </p:txBody>
-      </p:sp>
-      <p:sp>
-        <p:nvSpPr>
-          <p:cNvPr id="760" name="TextShape 25">
-            <a:extLst>
-              <a:ext uri="{FF2B5EF4-FFF2-40B4-BE49-F238E27FC236}">
-                <a16:creationId xmlns:a16="http://schemas.microsoft.com/office/drawing/2014/main" id="{71DB0689-3CC3-36AD-9759-01842181A3FA}"/>
-              </a:ext>
-            </a:extLst>
-          </p:cNvPr>
-          <p:cNvSpPr txBox="1"/>
-          <p:nvPr/>
-        </p:nvSpPr>
-        <p:spPr>
-          <a:xfrm>
-            <a:off x="6348000" y="5234400"/>
-            <a:ext cx="1314720" cy="689760"/>
-          </a:xfrm>
-          <a:prstGeom prst="rect">
-            <a:avLst/>
-          </a:prstGeom>
-          <a:noFill/>
-          <a:ln w="0">
-            <a:noFill/>
-          </a:ln>
-        </p:spPr>
-        <p:txBody>
-          <a:bodyPr lIns="90000" tIns="45000" rIns="90000" bIns="45000">
-            <a:noAutofit/>
-          </a:bodyPr>
-          <a:lstStyle/>
-          <a:p>
-            <a:r>
-              <a:rPr lang="en-GB" sz="1400" spc="-1" dirty="0">
-                <a:latin typeface="Arial"/>
-              </a:rPr>
-              <a:t>hated the cast, hated the plot</a:t>
-            </a:r>
-          </a:p>
-        </p:txBody>
-      </p:sp>
-      <p:sp>
-        <p:nvSpPr>
           <p:cNvPr id="2" name="Title 1">
             <a:extLst>
               <a:ext uri="{FF2B5EF4-FFF2-40B4-BE49-F238E27FC236}">
@@ -18465,10 +17788,10 @@
       </p:sp>
       <p:sp>
         <p:nvSpPr>
-          <p:cNvPr id="4" name="CustomShape 12">
+          <p:cNvPr id="15" name="Line 4">
             <a:extLst>
               <a:ext uri="{FF2B5EF4-FFF2-40B4-BE49-F238E27FC236}">
-                <a16:creationId xmlns:a16="http://schemas.microsoft.com/office/drawing/2014/main" id="{FD8F5B23-1914-F464-3C51-84F1F6916B9C}"/>
+                <a16:creationId xmlns:a16="http://schemas.microsoft.com/office/drawing/2014/main" id="{18EDDCC6-FB83-DB07-A9F8-13838935ECE0}"/>
               </a:ext>
             </a:extLst>
           </p:cNvPr>
@@ -18477,19 +17800,17 @@
         </p:nvSpPr>
         <p:spPr>
           <a:xfrm>
-            <a:off x="8896525" y="2402974"/>
-            <a:ext cx="360000" cy="360000"/>
-          </a:xfrm>
-          <a:prstGeom prst="ellipse">
+            <a:off x="7860000" y="3744000"/>
+            <a:ext cx="2304000" cy="0"/>
+          </a:xfrm>
+          <a:prstGeom prst="line">
             <a:avLst/>
           </a:prstGeom>
-          <a:solidFill>
-            <a:srgbClr val="729FCF"/>
-          </a:solidFill>
-          <a:ln w="0">
+          <a:ln w="12700">
             <a:solidFill>
-              <a:srgbClr val="3465A4"/>
+              <a:srgbClr val="000000"/>
             </a:solidFill>
+            <a:tailEnd type="none" w="med" len="med"/>
           </a:ln>
         </p:spPr>
         <p:style>
@@ -18514,10 +17835,10 @@
       </p:sp>
       <p:sp>
         <p:nvSpPr>
-          <p:cNvPr id="5" name="Line 8">
+          <p:cNvPr id="16" name="Line 5">
             <a:extLst>
               <a:ext uri="{FF2B5EF4-FFF2-40B4-BE49-F238E27FC236}">
-                <a16:creationId xmlns:a16="http://schemas.microsoft.com/office/drawing/2014/main" id="{A9AC75BF-270E-5BB7-A712-16D5577DC30B}"/>
+                <a16:creationId xmlns:a16="http://schemas.microsoft.com/office/drawing/2014/main" id="{E09136A2-A8FA-A1F2-4040-8B57725CB484}"/>
               </a:ext>
             </a:extLst>
           </p:cNvPr>
@@ -18525,9 +17846,152 @@
           <p:nvPr/>
         </p:nvSpPr>
         <p:spPr>
-          <a:xfrm flipH="1" flipV="1">
-            <a:off x="7872046" y="2575385"/>
-            <a:ext cx="971013" cy="0"/>
+          <a:xfrm flipV="1">
+            <a:off x="7859999" y="1558050"/>
+            <a:ext cx="8747" cy="2185949"/>
+          </a:xfrm>
+          <a:prstGeom prst="line">
+            <a:avLst/>
+          </a:prstGeom>
+          <a:ln w="12700">
+            <a:solidFill>
+              <a:srgbClr val="000000"/>
+            </a:solidFill>
+            <a:tailEnd type="none" w="med" len="med"/>
+          </a:ln>
+        </p:spPr>
+        <p:style>
+          <a:lnRef idx="0">
+            <a:scrgbClr r="0" g="0" b="0"/>
+          </a:lnRef>
+          <a:fillRef idx="0">
+            <a:scrgbClr r="0" g="0" b="0"/>
+          </a:fillRef>
+          <a:effectRef idx="0">
+            <a:scrgbClr r="0" g="0" b="0"/>
+          </a:effectRef>
+          <a:fontRef idx="minor"/>
+        </p:style>
+        <p:txBody>
+          <a:bodyPr/>
+          <a:lstStyle/>
+          <a:p>
+            <a:endParaRPr lang="en-US"/>
+          </a:p>
+        </p:txBody>
+      </p:sp>
+      <p:sp>
+        <p:nvSpPr>
+          <p:cNvPr id="17" name="Line 6">
+            <a:extLst>
+              <a:ext uri="{FF2B5EF4-FFF2-40B4-BE49-F238E27FC236}">
+                <a16:creationId xmlns:a16="http://schemas.microsoft.com/office/drawing/2014/main" id="{20E286D3-ED93-812C-3499-2940291D5196}"/>
+              </a:ext>
+            </a:extLst>
+          </p:cNvPr>
+          <p:cNvSpPr/>
+          <p:nvPr/>
+        </p:nvSpPr>
+        <p:spPr>
+          <a:xfrm flipH="1">
+            <a:off x="6118066" y="3744000"/>
+            <a:ext cx="1741934" cy="1712761"/>
+          </a:xfrm>
+          <a:prstGeom prst="line">
+            <a:avLst/>
+          </a:prstGeom>
+          <a:ln w="12700">
+            <a:solidFill>
+              <a:srgbClr val="000000"/>
+            </a:solidFill>
+            <a:tailEnd type="none" w="med" len="med"/>
+          </a:ln>
+        </p:spPr>
+        <p:style>
+          <a:lnRef idx="0">
+            <a:scrgbClr r="0" g="0" b="0"/>
+          </a:lnRef>
+          <a:fillRef idx="0">
+            <a:scrgbClr r="0" g="0" b="0"/>
+          </a:fillRef>
+          <a:effectRef idx="0">
+            <a:scrgbClr r="0" g="0" b="0"/>
+          </a:effectRef>
+          <a:fontRef idx="minor"/>
+        </p:style>
+        <p:txBody>
+          <a:bodyPr/>
+          <a:lstStyle/>
+          <a:p>
+            <a:endParaRPr lang="en-US"/>
+          </a:p>
+        </p:txBody>
+      </p:sp>
+      <p:sp>
+        <p:nvSpPr>
+          <p:cNvPr id="18" name="CustomShape 7">
+            <a:extLst>
+              <a:ext uri="{FF2B5EF4-FFF2-40B4-BE49-F238E27FC236}">
+                <a16:creationId xmlns:a16="http://schemas.microsoft.com/office/drawing/2014/main" id="{731F27B8-1887-30A1-F81A-0F076B5C1CE2}"/>
+              </a:ext>
+            </a:extLst>
+          </p:cNvPr>
+          <p:cNvSpPr/>
+          <p:nvPr/>
+        </p:nvSpPr>
+        <p:spPr>
+          <a:xfrm>
+            <a:off x="6349080" y="4933080"/>
+            <a:ext cx="360000" cy="360000"/>
+          </a:xfrm>
+          <a:prstGeom prst="ellipse">
+            <a:avLst/>
+          </a:prstGeom>
+          <a:solidFill>
+            <a:srgbClr val="729FCF"/>
+          </a:solidFill>
+          <a:ln w="12700">
+            <a:solidFill>
+              <a:srgbClr val="3465A4"/>
+            </a:solidFill>
+          </a:ln>
+        </p:spPr>
+        <p:style>
+          <a:lnRef idx="0">
+            <a:scrgbClr r="0" g="0" b="0"/>
+          </a:lnRef>
+          <a:fillRef idx="0">
+            <a:scrgbClr r="0" g="0" b="0"/>
+          </a:fillRef>
+          <a:effectRef idx="0">
+            <a:scrgbClr r="0" g="0" b="0"/>
+          </a:effectRef>
+          <a:fontRef idx="minor"/>
+        </p:style>
+        <p:txBody>
+          <a:bodyPr/>
+          <a:lstStyle/>
+          <a:p>
+            <a:endParaRPr lang="en-US"/>
+          </a:p>
+        </p:txBody>
+      </p:sp>
+      <p:sp>
+        <p:nvSpPr>
+          <p:cNvPr id="21" name="Line 10">
+            <a:extLst>
+              <a:ext uri="{FF2B5EF4-FFF2-40B4-BE49-F238E27FC236}">
+                <a16:creationId xmlns:a16="http://schemas.microsoft.com/office/drawing/2014/main" id="{AEEFBE68-8D81-299A-431C-AA17B03F3516}"/>
+              </a:ext>
+            </a:extLst>
+          </p:cNvPr>
+          <p:cNvSpPr/>
+          <p:nvPr/>
+        </p:nvSpPr>
+        <p:spPr>
+          <a:xfrm>
+            <a:off x="7320000" y="4320000"/>
+            <a:ext cx="1080000" cy="0"/>
           </a:xfrm>
           <a:prstGeom prst="line">
             <a:avLst/>
@@ -18564,10 +18028,10 @@
       </p:sp>
       <p:sp>
         <p:nvSpPr>
-          <p:cNvPr id="6" name="Line 9">
+          <p:cNvPr id="22" name="Line 11">
             <a:extLst>
               <a:ext uri="{FF2B5EF4-FFF2-40B4-BE49-F238E27FC236}">
-                <a16:creationId xmlns:a16="http://schemas.microsoft.com/office/drawing/2014/main" id="{94BD6A63-AFC0-F7A8-D0C3-0D6E280BD625}"/>
+                <a16:creationId xmlns:a16="http://schemas.microsoft.com/office/drawing/2014/main" id="{C4FCB609-204A-E93A-3A7C-A0F66B1B21EA}"/>
               </a:ext>
             </a:extLst>
           </p:cNvPr>
@@ -18576,8 +18040,8 @@
         </p:nvSpPr>
         <p:spPr>
           <a:xfrm flipV="1">
-            <a:off x="9084000" y="2762974"/>
-            <a:ext cx="0" cy="900720"/>
+            <a:off x="8616000" y="3744000"/>
+            <a:ext cx="468000" cy="504000"/>
           </a:xfrm>
           <a:prstGeom prst="line">
             <a:avLst/>
@@ -18614,130 +18078,10 @@
       </p:sp>
       <p:sp>
         <p:nvSpPr>
-          <p:cNvPr id="7" name="TextShape 24">
+          <p:cNvPr id="23" name="CustomShape 12">
             <a:extLst>
               <a:ext uri="{FF2B5EF4-FFF2-40B4-BE49-F238E27FC236}">
-                <a16:creationId xmlns:a16="http://schemas.microsoft.com/office/drawing/2014/main" id="{17B19A2C-1464-53FB-BBAE-939A301BC8F0}"/>
-              </a:ext>
-            </a:extLst>
-          </p:cNvPr>
-          <p:cNvSpPr txBox="1"/>
-          <p:nvPr/>
-        </p:nvSpPr>
-        <p:spPr>
-          <a:xfrm>
-            <a:off x="7854900" y="2242110"/>
-            <a:ext cx="280470" cy="302580"/>
-          </a:xfrm>
-          <a:prstGeom prst="rect">
-            <a:avLst/>
-          </a:prstGeom>
-          <a:noFill/>
-          <a:ln w="0">
-            <a:noFill/>
-          </a:ln>
-        </p:spPr>
-        <p:txBody>
-          <a:bodyPr lIns="90000" tIns="45000" rIns="90000" bIns="45000">
-            <a:noAutofit/>
-          </a:bodyPr>
-          <a:lstStyle/>
-          <a:p>
-            <a:r>
-              <a:rPr lang="en-GB" sz="1400" spc="-1" dirty="0">
-                <a:latin typeface="Arial"/>
-              </a:rPr>
-              <a:t>1</a:t>
-            </a:r>
-          </a:p>
-        </p:txBody>
-      </p:sp>
-      <p:sp>
-        <p:nvSpPr>
-          <p:cNvPr id="8" name="TextShape 24">
-            <a:extLst>
-              <a:ext uri="{FF2B5EF4-FFF2-40B4-BE49-F238E27FC236}">
-                <a16:creationId xmlns:a16="http://schemas.microsoft.com/office/drawing/2014/main" id="{B9D8A652-F068-A285-D141-B44C0BACAE5E}"/>
-              </a:ext>
-            </a:extLst>
-          </p:cNvPr>
-          <p:cNvSpPr txBox="1"/>
-          <p:nvPr/>
-        </p:nvSpPr>
-        <p:spPr>
-          <a:xfrm>
-            <a:off x="7441400" y="4002791"/>
-            <a:ext cx="280470" cy="302580"/>
-          </a:xfrm>
-          <a:prstGeom prst="rect">
-            <a:avLst/>
-          </a:prstGeom>
-          <a:noFill/>
-          <a:ln w="0">
-            <a:noFill/>
-          </a:ln>
-        </p:spPr>
-        <p:txBody>
-          <a:bodyPr lIns="90000" tIns="45000" rIns="90000" bIns="45000">
-            <a:noAutofit/>
-          </a:bodyPr>
-          <a:lstStyle/>
-          <a:p>
-            <a:r>
-              <a:rPr lang="en-GB" sz="1400" spc="-1" dirty="0">
-                <a:latin typeface="Arial"/>
-              </a:rPr>
-              <a:t>1</a:t>
-            </a:r>
-          </a:p>
-        </p:txBody>
-      </p:sp>
-      <p:sp>
-        <p:nvSpPr>
-          <p:cNvPr id="9" name="TextShape 24">
-            <a:extLst>
-              <a:ext uri="{FF2B5EF4-FFF2-40B4-BE49-F238E27FC236}">
-                <a16:creationId xmlns:a16="http://schemas.microsoft.com/office/drawing/2014/main" id="{4D02D3A1-3EB7-1431-A062-FA8F0137C957}"/>
-              </a:ext>
-            </a:extLst>
-          </p:cNvPr>
-          <p:cNvSpPr txBox="1"/>
-          <p:nvPr/>
-        </p:nvSpPr>
-        <p:spPr>
-          <a:xfrm>
-            <a:off x="9116290" y="3512404"/>
-            <a:ext cx="280470" cy="302580"/>
-          </a:xfrm>
-          <a:prstGeom prst="rect">
-            <a:avLst/>
-          </a:prstGeom>
-          <a:noFill/>
-          <a:ln w="0">
-            <a:noFill/>
-          </a:ln>
-        </p:spPr>
-        <p:txBody>
-          <a:bodyPr lIns="90000" tIns="45000" rIns="90000" bIns="45000">
-            <a:noAutofit/>
-          </a:bodyPr>
-          <a:lstStyle/>
-          <a:p>
-            <a:r>
-              <a:rPr lang="en-GB" sz="1400" spc="-1" dirty="0">
-                <a:latin typeface="Arial"/>
-              </a:rPr>
-              <a:t>1</a:t>
-            </a:r>
-          </a:p>
-        </p:txBody>
-      </p:sp>
-      <p:sp>
-        <p:nvSpPr>
-          <p:cNvPr id="749" name="CustomShape 14">
-            <a:extLst>
-              <a:ext uri="{FF2B5EF4-FFF2-40B4-BE49-F238E27FC236}">
-                <a16:creationId xmlns:a16="http://schemas.microsoft.com/office/drawing/2014/main" id="{84554A8B-F2D9-B4D5-6FA9-2BF6F2B10396}"/>
+                <a16:creationId xmlns:a16="http://schemas.microsoft.com/office/drawing/2014/main" id="{00F89F45-0823-1D79-AD81-026DDF78B0A5}"/>
               </a:ext>
             </a:extLst>
           </p:cNvPr>
@@ -18746,7 +18090,7 @@
         </p:nvSpPr>
         <p:spPr>
           <a:xfrm>
-            <a:off x="7681297" y="2457720"/>
+            <a:off x="8328000" y="4176000"/>
             <a:ext cx="360000" cy="360000"/>
           </a:xfrm>
           <a:prstGeom prst="ellipse">
@@ -18755,7 +18099,7 @@
           <a:solidFill>
             <a:srgbClr val="729FCF"/>
           </a:solidFill>
-          <a:ln w="0">
+          <a:ln w="12700">
             <a:solidFill>
               <a:srgbClr val="3465A4"/>
             </a:solidFill>
@@ -18777,56 +18121,16 @@
           <a:bodyPr/>
           <a:lstStyle/>
           <a:p>
-            <a:endParaRPr lang="en-US"/>
-          </a:p>
-        </p:txBody>
-      </p:sp>
-      <p:sp>
-        <p:nvSpPr>
-          <p:cNvPr id="10" name="TextShape 23">
+            <a:endParaRPr lang="en-US" dirty="0"/>
+          </a:p>
+        </p:txBody>
+      </p:sp>
+      <p:sp>
+        <p:nvSpPr>
+          <p:cNvPr id="24" name="CustomShape 13">
             <a:extLst>
               <a:ext uri="{FF2B5EF4-FFF2-40B4-BE49-F238E27FC236}">
-                <a16:creationId xmlns:a16="http://schemas.microsoft.com/office/drawing/2014/main" id="{732313AE-1936-F8D6-51A5-78FB82CDB354}"/>
-              </a:ext>
-            </a:extLst>
-          </p:cNvPr>
-          <p:cNvSpPr txBox="1"/>
-          <p:nvPr/>
-        </p:nvSpPr>
-        <p:spPr>
-          <a:xfrm>
-            <a:off x="6908017" y="2533170"/>
-            <a:ext cx="953280" cy="489960"/>
-          </a:xfrm>
-          <a:prstGeom prst="rect">
-            <a:avLst/>
-          </a:prstGeom>
-          <a:noFill/>
-          <a:ln w="0">
-            <a:noFill/>
-          </a:ln>
-        </p:spPr>
-        <p:txBody>
-          <a:bodyPr lIns="90000" tIns="45000" rIns="90000" bIns="45000">
-            <a:noAutofit/>
-          </a:bodyPr>
-          <a:lstStyle/>
-          <a:p>
-            <a:r>
-              <a:rPr lang="en-GB" sz="1400" spc="-1" dirty="0">
-                <a:latin typeface="Arial"/>
-              </a:rPr>
-              <a:t>loved it!</a:t>
-            </a:r>
-          </a:p>
-        </p:txBody>
-      </p:sp>
-      <p:sp>
-        <p:nvSpPr>
-          <p:cNvPr id="12" name="Line 6">
-            <a:extLst>
-              <a:ext uri="{FF2B5EF4-FFF2-40B4-BE49-F238E27FC236}">
-                <a16:creationId xmlns:a16="http://schemas.microsoft.com/office/drawing/2014/main" id="{EE0044A6-4DC0-023E-9E37-8AA2763B665B}"/>
+                <a16:creationId xmlns:a16="http://schemas.microsoft.com/office/drawing/2014/main" id="{09EE21B7-367B-C800-8D46-4063EF73BF05}"/>
               </a:ext>
             </a:extLst>
           </p:cNvPr>
@@ -18834,18 +18138,20 @@
           <p:nvPr/>
         </p:nvSpPr>
         <p:spPr>
-          <a:xfrm flipH="1">
-            <a:off x="6093934" y="1564919"/>
-            <a:ext cx="1766038" cy="1675037"/>
-          </a:xfrm>
-          <a:prstGeom prst="line">
+          <a:xfrm>
+            <a:off x="7104720" y="4140720"/>
+            <a:ext cx="360000" cy="360000"/>
+          </a:xfrm>
+          <a:prstGeom prst="ellipse">
             <a:avLst/>
           </a:prstGeom>
-          <a:ln w="0">
+          <a:solidFill>
+            <a:srgbClr val="729FCF"/>
+          </a:solidFill>
+          <a:ln w="12700">
             <a:solidFill>
-              <a:srgbClr val="000000"/>
+              <a:srgbClr val="3465A4"/>
             </a:solidFill>
-            <a:tailEnd type="none" w="med" len="med"/>
           </a:ln>
         </p:spPr>
         <p:style>
@@ -18864,16 +18170,305 @@
           <a:bodyPr/>
           <a:lstStyle/>
           <a:p>
-            <a:endParaRPr lang="en-US"/>
-          </a:p>
-        </p:txBody>
-      </p:sp>
-      <p:sp>
-        <p:nvSpPr>
-          <p:cNvPr id="13" name="Line 4">
+            <a:endParaRPr lang="en-US" dirty="0"/>
+          </a:p>
+        </p:txBody>
+      </p:sp>
+      <p:sp>
+        <p:nvSpPr>
+          <p:cNvPr id="25" name="TextShape 15">
             <a:extLst>
               <a:ext uri="{FF2B5EF4-FFF2-40B4-BE49-F238E27FC236}">
-                <a16:creationId xmlns:a16="http://schemas.microsoft.com/office/drawing/2014/main" id="{4593C395-ADB2-2B26-652E-75344F3554B4}"/>
+                <a16:creationId xmlns:a16="http://schemas.microsoft.com/office/drawing/2014/main" id="{A3C58434-8C9F-F57D-04F7-EB5FBC4C30E6}"/>
+              </a:ext>
+            </a:extLst>
+          </p:cNvPr>
+          <p:cNvSpPr txBox="1"/>
+          <p:nvPr/>
+        </p:nvSpPr>
+        <p:spPr>
+          <a:xfrm>
+            <a:off x="7068000" y="1332000"/>
+            <a:ext cx="814680" cy="290160"/>
+          </a:xfrm>
+          <a:prstGeom prst="rect">
+            <a:avLst/>
+          </a:prstGeom>
+          <a:noFill/>
+          <a:ln w="0">
+            <a:noFill/>
+          </a:ln>
+        </p:spPr>
+        <p:txBody>
+          <a:bodyPr lIns="90000" tIns="45000" rIns="90000" bIns="45000">
+            <a:noAutofit/>
+          </a:bodyPr>
+          <a:lstStyle/>
+          <a:p>
+            <a:r>
+              <a:rPr lang="en-GB" sz="1400" b="1" i="1" spc="-1" dirty="0">
+                <a:latin typeface="Arial"/>
+              </a:rPr>
+              <a:t>loved</a:t>
+            </a:r>
+            <a:endParaRPr lang="en-GB" sz="1400" spc="-1" dirty="0">
+              <a:latin typeface="Arial"/>
+            </a:endParaRPr>
+          </a:p>
+        </p:txBody>
+      </p:sp>
+      <p:sp>
+        <p:nvSpPr>
+          <p:cNvPr id="26" name="TextShape 16">
+            <a:extLst>
+              <a:ext uri="{FF2B5EF4-FFF2-40B4-BE49-F238E27FC236}">
+                <a16:creationId xmlns:a16="http://schemas.microsoft.com/office/drawing/2014/main" id="{A9ED0E32-DEC6-91DF-5B10-B99D92CF0A9E}"/>
+              </a:ext>
+            </a:extLst>
+          </p:cNvPr>
+          <p:cNvSpPr txBox="1"/>
+          <p:nvPr/>
+        </p:nvSpPr>
+        <p:spPr>
+          <a:xfrm>
+            <a:off x="9732360" y="3744000"/>
+            <a:ext cx="953280" cy="290160"/>
+          </a:xfrm>
+          <a:prstGeom prst="rect">
+            <a:avLst/>
+          </a:prstGeom>
+          <a:noFill/>
+          <a:ln w="0">
+            <a:noFill/>
+          </a:ln>
+        </p:spPr>
+        <p:txBody>
+          <a:bodyPr lIns="90000" tIns="45000" rIns="90000" bIns="45000">
+            <a:noAutofit/>
+          </a:bodyPr>
+          <a:lstStyle/>
+          <a:p>
+            <a:r>
+              <a:rPr lang="en-GB" sz="1400" b="1" i="1" spc="-1" dirty="0">
+                <a:latin typeface="Arial"/>
+              </a:rPr>
+              <a:t>amazing</a:t>
+            </a:r>
+            <a:endParaRPr lang="en-GB" sz="1400" spc="-1" dirty="0">
+              <a:latin typeface="Arial"/>
+            </a:endParaRPr>
+          </a:p>
+        </p:txBody>
+      </p:sp>
+      <p:sp>
+        <p:nvSpPr>
+          <p:cNvPr id="32" name="TextShape 17">
+            <a:extLst>
+              <a:ext uri="{FF2B5EF4-FFF2-40B4-BE49-F238E27FC236}">
+                <a16:creationId xmlns:a16="http://schemas.microsoft.com/office/drawing/2014/main" id="{47778ACA-2554-C418-55C1-C2848AB577F5}"/>
+              </a:ext>
+            </a:extLst>
+          </p:cNvPr>
+          <p:cNvSpPr txBox="1"/>
+          <p:nvPr/>
+        </p:nvSpPr>
+        <p:spPr>
+          <a:xfrm>
+            <a:off x="5394360" y="5292000"/>
+            <a:ext cx="816120" cy="290160"/>
+          </a:xfrm>
+          <a:prstGeom prst="rect">
+            <a:avLst/>
+          </a:prstGeom>
+          <a:noFill/>
+          <a:ln w="0">
+            <a:noFill/>
+          </a:ln>
+        </p:spPr>
+        <p:txBody>
+          <a:bodyPr lIns="90000" tIns="45000" rIns="90000" bIns="45000">
+            <a:noAutofit/>
+          </a:bodyPr>
+          <a:lstStyle/>
+          <a:p>
+            <a:r>
+              <a:rPr lang="en-GB" sz="1400" b="1" i="1" spc="-1" dirty="0">
+                <a:latin typeface="Arial"/>
+              </a:rPr>
+              <a:t>hated</a:t>
+            </a:r>
+            <a:endParaRPr lang="en-GB" sz="1400" spc="-1" dirty="0">
+              <a:latin typeface="Arial"/>
+            </a:endParaRPr>
+          </a:p>
+        </p:txBody>
+      </p:sp>
+      <p:sp>
+        <p:nvSpPr>
+          <p:cNvPr id="33" name="TextShape 22">
+            <a:extLst>
+              <a:ext uri="{FF2B5EF4-FFF2-40B4-BE49-F238E27FC236}">
+                <a16:creationId xmlns:a16="http://schemas.microsoft.com/office/drawing/2014/main" id="{E6D08841-8C32-2608-9E6A-2251D453C146}"/>
+              </a:ext>
+            </a:extLst>
+          </p:cNvPr>
+          <p:cNvSpPr txBox="1"/>
+          <p:nvPr/>
+        </p:nvSpPr>
+        <p:spPr>
+          <a:xfrm>
+            <a:off x="8696640" y="4284000"/>
+            <a:ext cx="1361760" cy="489960"/>
+          </a:xfrm>
+          <a:prstGeom prst="rect">
+            <a:avLst/>
+          </a:prstGeom>
+          <a:noFill/>
+          <a:ln w="0">
+            <a:noFill/>
+          </a:ln>
+        </p:spPr>
+        <p:txBody>
+          <a:bodyPr lIns="90000" tIns="45000" rIns="90000" bIns="45000">
+            <a:noAutofit/>
+          </a:bodyPr>
+          <a:lstStyle/>
+          <a:p>
+            <a:r>
+              <a:rPr lang="en-GB" sz="1400" spc="-1" dirty="0">
+                <a:latin typeface="Arial"/>
+              </a:rPr>
+              <a:t>amazing how much I hated this</a:t>
+            </a:r>
+          </a:p>
+        </p:txBody>
+      </p:sp>
+      <p:sp>
+        <p:nvSpPr>
+          <p:cNvPr id="34" name="TextShape 23">
+            <a:extLst>
+              <a:ext uri="{FF2B5EF4-FFF2-40B4-BE49-F238E27FC236}">
+                <a16:creationId xmlns:a16="http://schemas.microsoft.com/office/drawing/2014/main" id="{B5FBAAC0-220B-F5E5-6A8B-2B05B64CCEBF}"/>
+              </a:ext>
+            </a:extLst>
+          </p:cNvPr>
+          <p:cNvSpPr txBox="1"/>
+          <p:nvPr/>
+        </p:nvSpPr>
+        <p:spPr>
+          <a:xfrm>
+            <a:off x="7111402" y="4477680"/>
+            <a:ext cx="953280" cy="489960"/>
+          </a:xfrm>
+          <a:prstGeom prst="rect">
+            <a:avLst/>
+          </a:prstGeom>
+          <a:noFill/>
+          <a:ln w="0">
+            <a:noFill/>
+          </a:ln>
+        </p:spPr>
+        <p:txBody>
+          <a:bodyPr lIns="90000" tIns="45000" rIns="90000" bIns="45000">
+            <a:noAutofit/>
+          </a:bodyPr>
+          <a:lstStyle/>
+          <a:p>
+            <a:r>
+              <a:rPr lang="en-GB" sz="1400" spc="-1" dirty="0">
+                <a:latin typeface="Arial"/>
+              </a:rPr>
+              <a:t>hated this movie</a:t>
+            </a:r>
+          </a:p>
+        </p:txBody>
+      </p:sp>
+      <p:sp>
+        <p:nvSpPr>
+          <p:cNvPr id="35" name="TextShape 24">
+            <a:extLst>
+              <a:ext uri="{FF2B5EF4-FFF2-40B4-BE49-F238E27FC236}">
+                <a16:creationId xmlns:a16="http://schemas.microsoft.com/office/drawing/2014/main" id="{A266D705-2D6E-089D-5BF2-690849782AAD}"/>
+              </a:ext>
+            </a:extLst>
+          </p:cNvPr>
+          <p:cNvSpPr txBox="1"/>
+          <p:nvPr/>
+        </p:nvSpPr>
+        <p:spPr>
+          <a:xfrm>
+            <a:off x="9265296" y="2348460"/>
+            <a:ext cx="1159474" cy="489960"/>
+          </a:xfrm>
+          <a:prstGeom prst="rect">
+            <a:avLst/>
+          </a:prstGeom>
+          <a:noFill/>
+          <a:ln w="0">
+            <a:noFill/>
+          </a:ln>
+        </p:spPr>
+        <p:txBody>
+          <a:bodyPr lIns="90000" tIns="45000" rIns="90000" bIns="45000">
+            <a:noAutofit/>
+          </a:bodyPr>
+          <a:lstStyle/>
+          <a:p>
+            <a:r>
+              <a:rPr lang="en-GB" sz="1400" spc="-1" dirty="0">
+                <a:latin typeface="Arial"/>
+              </a:rPr>
+              <a:t>loved this amazing movie</a:t>
+            </a:r>
+          </a:p>
+        </p:txBody>
+      </p:sp>
+      <p:sp>
+        <p:nvSpPr>
+          <p:cNvPr id="36" name="TextShape 25">
+            <a:extLst>
+              <a:ext uri="{FF2B5EF4-FFF2-40B4-BE49-F238E27FC236}">
+                <a16:creationId xmlns:a16="http://schemas.microsoft.com/office/drawing/2014/main" id="{C16ED685-4E67-59E5-F9C4-A5D887EF2402}"/>
+              </a:ext>
+            </a:extLst>
+          </p:cNvPr>
+          <p:cNvSpPr txBox="1"/>
+          <p:nvPr/>
+        </p:nvSpPr>
+        <p:spPr>
+          <a:xfrm>
+            <a:off x="6348000" y="5234400"/>
+            <a:ext cx="1314720" cy="689760"/>
+          </a:xfrm>
+          <a:prstGeom prst="rect">
+            <a:avLst/>
+          </a:prstGeom>
+          <a:noFill/>
+          <a:ln w="0">
+            <a:noFill/>
+          </a:ln>
+        </p:spPr>
+        <p:txBody>
+          <a:bodyPr lIns="90000" tIns="45000" rIns="90000" bIns="45000">
+            <a:noAutofit/>
+          </a:bodyPr>
+          <a:lstStyle/>
+          <a:p>
+            <a:r>
+              <a:rPr lang="en-GB" sz="1400" spc="-1" dirty="0">
+                <a:latin typeface="Arial"/>
+              </a:rPr>
+              <a:t>hated the cast, hated the plot</a:t>
+            </a:r>
+          </a:p>
+        </p:txBody>
+      </p:sp>
+      <p:sp>
+        <p:nvSpPr>
+          <p:cNvPr id="37" name="CustomShape 12">
+            <a:extLst>
+              <a:ext uri="{FF2B5EF4-FFF2-40B4-BE49-F238E27FC236}">
+                <a16:creationId xmlns:a16="http://schemas.microsoft.com/office/drawing/2014/main" id="{D67363D9-13FA-1DFF-D4AC-C3A9CBB06396}"/>
               </a:ext>
             </a:extLst>
           </p:cNvPr>
@@ -18881,18 +18476,20 @@
           <p:nvPr/>
         </p:nvSpPr>
         <p:spPr>
-          <a:xfrm flipV="1">
-            <a:off x="7868745" y="1543421"/>
-            <a:ext cx="2268671" cy="14628"/>
-          </a:xfrm>
-          <a:prstGeom prst="line">
+          <a:xfrm>
+            <a:off x="8896525" y="2402974"/>
+            <a:ext cx="360000" cy="360000"/>
+          </a:xfrm>
+          <a:prstGeom prst="ellipse">
             <a:avLst/>
           </a:prstGeom>
-          <a:ln w="0">
+          <a:solidFill>
+            <a:srgbClr val="729FCF"/>
+          </a:solidFill>
+          <a:ln w="12700">
             <a:solidFill>
-              <a:srgbClr val="000000"/>
+              <a:srgbClr val="3465A4"/>
             </a:solidFill>
-            <a:tailEnd type="none" w="med" len="med"/>
           </a:ln>
         </p:spPr>
         <p:style>
@@ -18917,10 +18514,10 @@
       </p:sp>
       <p:sp>
         <p:nvSpPr>
-          <p:cNvPr id="19" name="Line 6">
+          <p:cNvPr id="38" name="Line 9">
             <a:extLst>
               <a:ext uri="{FF2B5EF4-FFF2-40B4-BE49-F238E27FC236}">
-                <a16:creationId xmlns:a16="http://schemas.microsoft.com/office/drawing/2014/main" id="{1C086094-2AF4-CBAD-6978-32663A7CD831}"/>
+                <a16:creationId xmlns:a16="http://schemas.microsoft.com/office/drawing/2014/main" id="{1FACF11D-891E-9DEC-1040-4828E03A7A02}"/>
               </a:ext>
             </a:extLst>
           </p:cNvPr>
@@ -18928,18 +18525,21 @@
           <p:nvPr/>
         </p:nvSpPr>
         <p:spPr>
-          <a:xfrm flipH="1">
-            <a:off x="8432287" y="3740835"/>
-            <a:ext cx="1724623" cy="1715926"/>
+          <a:xfrm flipV="1">
+            <a:off x="9084000" y="2762974"/>
+            <a:ext cx="0" cy="900720"/>
           </a:xfrm>
           <a:prstGeom prst="line">
             <a:avLst/>
           </a:prstGeom>
-          <a:ln w="0">
+          <a:ln w="36000">
             <a:solidFill>
-              <a:srgbClr val="000000"/>
+              <a:schemeClr val="accent6"/>
             </a:solidFill>
-            <a:tailEnd type="none" w="med" len="med"/>
+            <a:custDash>
+              <a:ds d="197000" sp="127000"/>
+            </a:custDash>
+            <a:round/>
           </a:ln>
         </p:spPr>
         <p:style>
@@ -18964,10 +18564,170 @@
       </p:sp>
       <p:sp>
         <p:nvSpPr>
-          <p:cNvPr id="20" name="Line 6">
+          <p:cNvPr id="39" name="TextShape 24">
             <a:extLst>
               <a:ext uri="{FF2B5EF4-FFF2-40B4-BE49-F238E27FC236}">
-                <a16:creationId xmlns:a16="http://schemas.microsoft.com/office/drawing/2014/main" id="{BE7F8635-D9D0-A15E-4714-F4C8A77C7A4E}"/>
+                <a16:creationId xmlns:a16="http://schemas.microsoft.com/office/drawing/2014/main" id="{F976B2B7-AF59-C126-1D06-15FA3DC5B855}"/>
+              </a:ext>
+            </a:extLst>
+          </p:cNvPr>
+          <p:cNvSpPr txBox="1"/>
+          <p:nvPr/>
+        </p:nvSpPr>
+        <p:spPr>
+          <a:xfrm>
+            <a:off x="7854900" y="2242110"/>
+            <a:ext cx="280470" cy="302580"/>
+          </a:xfrm>
+          <a:prstGeom prst="rect">
+            <a:avLst/>
+          </a:prstGeom>
+          <a:noFill/>
+          <a:ln w="0">
+            <a:noFill/>
+          </a:ln>
+        </p:spPr>
+        <p:txBody>
+          <a:bodyPr lIns="90000" tIns="45000" rIns="90000" bIns="45000">
+            <a:noAutofit/>
+          </a:bodyPr>
+          <a:lstStyle/>
+          <a:p>
+            <a:r>
+              <a:rPr lang="en-GB" sz="1400" spc="-1" dirty="0">
+                <a:latin typeface="Arial"/>
+              </a:rPr>
+              <a:t>1</a:t>
+            </a:r>
+          </a:p>
+        </p:txBody>
+      </p:sp>
+      <p:sp>
+        <p:nvSpPr>
+          <p:cNvPr id="40" name="TextShape 24">
+            <a:extLst>
+              <a:ext uri="{FF2B5EF4-FFF2-40B4-BE49-F238E27FC236}">
+                <a16:creationId xmlns:a16="http://schemas.microsoft.com/office/drawing/2014/main" id="{9BA7AB0C-9915-4CFA-29C0-3385F7FEE056}"/>
+              </a:ext>
+            </a:extLst>
+          </p:cNvPr>
+          <p:cNvSpPr txBox="1"/>
+          <p:nvPr/>
+        </p:nvSpPr>
+        <p:spPr>
+          <a:xfrm>
+            <a:off x="7441400" y="4002791"/>
+            <a:ext cx="280470" cy="302580"/>
+          </a:xfrm>
+          <a:prstGeom prst="rect">
+            <a:avLst/>
+          </a:prstGeom>
+          <a:noFill/>
+          <a:ln w="0">
+            <a:noFill/>
+          </a:ln>
+        </p:spPr>
+        <p:txBody>
+          <a:bodyPr lIns="90000" tIns="45000" rIns="90000" bIns="45000">
+            <a:noAutofit/>
+          </a:bodyPr>
+          <a:lstStyle/>
+          <a:p>
+            <a:r>
+              <a:rPr lang="en-GB" sz="1400" spc="-1" dirty="0">
+                <a:latin typeface="Arial"/>
+              </a:rPr>
+              <a:t>1</a:t>
+            </a:r>
+          </a:p>
+        </p:txBody>
+      </p:sp>
+      <p:sp>
+        <p:nvSpPr>
+          <p:cNvPr id="41" name="TextShape 24">
+            <a:extLst>
+              <a:ext uri="{FF2B5EF4-FFF2-40B4-BE49-F238E27FC236}">
+                <a16:creationId xmlns:a16="http://schemas.microsoft.com/office/drawing/2014/main" id="{E4E019E1-59E3-AD20-F93E-1E0969DDE1FF}"/>
+              </a:ext>
+            </a:extLst>
+          </p:cNvPr>
+          <p:cNvSpPr txBox="1"/>
+          <p:nvPr/>
+        </p:nvSpPr>
+        <p:spPr>
+          <a:xfrm>
+            <a:off x="9116290" y="3512404"/>
+            <a:ext cx="280470" cy="302580"/>
+          </a:xfrm>
+          <a:prstGeom prst="rect">
+            <a:avLst/>
+          </a:prstGeom>
+          <a:noFill/>
+          <a:ln w="0">
+            <a:noFill/>
+          </a:ln>
+        </p:spPr>
+        <p:txBody>
+          <a:bodyPr lIns="90000" tIns="45000" rIns="90000" bIns="45000">
+            <a:noAutofit/>
+          </a:bodyPr>
+          <a:lstStyle/>
+          <a:p>
+            <a:r>
+              <a:rPr lang="en-GB" sz="1400" spc="-1" dirty="0">
+                <a:latin typeface="Arial"/>
+              </a:rPr>
+              <a:t>1</a:t>
+            </a:r>
+          </a:p>
+        </p:txBody>
+      </p:sp>
+      <p:sp>
+        <p:nvSpPr>
+          <p:cNvPr id="42" name="TextShape 23">
+            <a:extLst>
+              <a:ext uri="{FF2B5EF4-FFF2-40B4-BE49-F238E27FC236}">
+                <a16:creationId xmlns:a16="http://schemas.microsoft.com/office/drawing/2014/main" id="{DF0AF347-3831-E6B4-E4E6-57AD593D266D}"/>
+              </a:ext>
+            </a:extLst>
+          </p:cNvPr>
+          <p:cNvSpPr txBox="1"/>
+          <p:nvPr/>
+        </p:nvSpPr>
+        <p:spPr>
+          <a:xfrm>
+            <a:off x="6908017" y="2533170"/>
+            <a:ext cx="953280" cy="489960"/>
+          </a:xfrm>
+          <a:prstGeom prst="rect">
+            <a:avLst/>
+          </a:prstGeom>
+          <a:noFill/>
+          <a:ln w="0">
+            <a:noFill/>
+          </a:ln>
+        </p:spPr>
+        <p:txBody>
+          <a:bodyPr lIns="90000" tIns="45000" rIns="90000" bIns="45000">
+            <a:noAutofit/>
+          </a:bodyPr>
+          <a:lstStyle/>
+          <a:p>
+            <a:r>
+              <a:rPr lang="en-GB" sz="1400" spc="-1" dirty="0">
+                <a:latin typeface="Arial"/>
+              </a:rPr>
+              <a:t>loved it!</a:t>
+            </a:r>
+          </a:p>
+        </p:txBody>
+      </p:sp>
+      <p:sp>
+        <p:nvSpPr>
+          <p:cNvPr id="43" name="Line 6">
+            <a:extLst>
+              <a:ext uri="{FF2B5EF4-FFF2-40B4-BE49-F238E27FC236}">
+                <a16:creationId xmlns:a16="http://schemas.microsoft.com/office/drawing/2014/main" id="{787E2F98-875D-1502-1E27-81FC35CFF7ED}"/>
               </a:ext>
             </a:extLst>
           </p:cNvPr>
@@ -18976,13 +18736,13 @@
         </p:nvSpPr>
         <p:spPr>
           <a:xfrm flipH="1">
-            <a:off x="8392524" y="1543421"/>
-            <a:ext cx="1744893" cy="1696537"/>
+            <a:off x="6093934" y="1564919"/>
+            <a:ext cx="1766038" cy="1675037"/>
           </a:xfrm>
           <a:prstGeom prst="line">
             <a:avLst/>
           </a:prstGeom>
-          <a:ln w="0">
+          <a:ln w="12700">
             <a:solidFill>
               <a:srgbClr val="000000"/>
             </a:solidFill>
@@ -19011,10 +18771,10 @@
       </p:sp>
       <p:sp>
         <p:nvSpPr>
-          <p:cNvPr id="27" name="Line 5">
+          <p:cNvPr id="44" name="Line 4">
             <a:extLst>
               <a:ext uri="{FF2B5EF4-FFF2-40B4-BE49-F238E27FC236}">
-                <a16:creationId xmlns:a16="http://schemas.microsoft.com/office/drawing/2014/main" id="{978A457C-2EE5-D06B-033F-F500E6C30ACE}"/>
+                <a16:creationId xmlns:a16="http://schemas.microsoft.com/office/drawing/2014/main" id="{6A47422E-A22E-937B-FD71-DCC623846BED}"/>
               </a:ext>
             </a:extLst>
           </p:cNvPr>
@@ -19022,14 +18782,14 @@
           <p:nvPr/>
         </p:nvSpPr>
         <p:spPr>
-          <a:xfrm flipH="1" flipV="1">
-            <a:off x="10137420" y="1544248"/>
-            <a:ext cx="29566" cy="2197414"/>
+          <a:xfrm flipV="1">
+            <a:off x="7868745" y="1543421"/>
+            <a:ext cx="2268671" cy="14628"/>
           </a:xfrm>
           <a:prstGeom prst="line">
             <a:avLst/>
           </a:prstGeom>
-          <a:ln w="0">
+          <a:ln w="12700">
             <a:solidFill>
               <a:srgbClr val="000000"/>
             </a:solidFill>
@@ -19058,10 +18818,10 @@
       </p:sp>
       <p:sp>
         <p:nvSpPr>
-          <p:cNvPr id="28" name="Line 4">
+          <p:cNvPr id="45" name="Line 6">
             <a:extLst>
               <a:ext uri="{FF2B5EF4-FFF2-40B4-BE49-F238E27FC236}">
-                <a16:creationId xmlns:a16="http://schemas.microsoft.com/office/drawing/2014/main" id="{FCA0EE99-27C4-A827-E5A5-74CA58182556}"/>
+                <a16:creationId xmlns:a16="http://schemas.microsoft.com/office/drawing/2014/main" id="{BDF0DB91-EBEE-4905-049E-DE006A2FC991}"/>
               </a:ext>
             </a:extLst>
           </p:cNvPr>
@@ -19069,14 +18829,14 @@
           <p:nvPr/>
         </p:nvSpPr>
         <p:spPr>
-          <a:xfrm>
-            <a:off x="6096000" y="3232850"/>
-            <a:ext cx="2304000" cy="0"/>
+          <a:xfrm flipH="1">
+            <a:off x="8432287" y="3740835"/>
+            <a:ext cx="1724623" cy="1715926"/>
           </a:xfrm>
           <a:prstGeom prst="line">
             <a:avLst/>
           </a:prstGeom>
-          <a:ln w="0">
+          <a:ln w="12700">
             <a:solidFill>
               <a:srgbClr val="000000"/>
             </a:solidFill>
@@ -19105,10 +18865,10 @@
       </p:sp>
       <p:sp>
         <p:nvSpPr>
-          <p:cNvPr id="29" name="Line 4">
+          <p:cNvPr id="46" name="Line 6">
             <a:extLst>
               <a:ext uri="{FF2B5EF4-FFF2-40B4-BE49-F238E27FC236}">
-                <a16:creationId xmlns:a16="http://schemas.microsoft.com/office/drawing/2014/main" id="{AE041204-0817-A64D-C510-66BD680970AA}"/>
+                <a16:creationId xmlns:a16="http://schemas.microsoft.com/office/drawing/2014/main" id="{0D50E824-CBEA-F158-F83E-C3AFC1227994}"/>
               </a:ext>
             </a:extLst>
           </p:cNvPr>
@@ -19116,14 +18876,14 @@
           <p:nvPr/>
         </p:nvSpPr>
         <p:spPr>
-          <a:xfrm>
-            <a:off x="6093934" y="5468516"/>
-            <a:ext cx="2341507" cy="0"/>
+          <a:xfrm flipH="1">
+            <a:off x="8392524" y="1543421"/>
+            <a:ext cx="1744893" cy="1696537"/>
           </a:xfrm>
           <a:prstGeom prst="line">
             <a:avLst/>
           </a:prstGeom>
-          <a:ln w="0">
+          <a:ln w="12700">
             <a:solidFill>
               <a:srgbClr val="000000"/>
             </a:solidFill>
@@ -19152,10 +18912,10 @@
       </p:sp>
       <p:sp>
         <p:nvSpPr>
-          <p:cNvPr id="30" name="Line 5">
+          <p:cNvPr id="47" name="Line 5">
             <a:extLst>
               <a:ext uri="{FF2B5EF4-FFF2-40B4-BE49-F238E27FC236}">
-                <a16:creationId xmlns:a16="http://schemas.microsoft.com/office/drawing/2014/main" id="{9F918B43-0042-0A01-F7F7-BA20BAE00C6E}"/>
+                <a16:creationId xmlns:a16="http://schemas.microsoft.com/office/drawing/2014/main" id="{22993249-6C7D-6A6D-026B-B53BFFBC0853}"/>
               </a:ext>
             </a:extLst>
           </p:cNvPr>
@@ -19164,13 +18924,13 @@
         </p:nvSpPr>
         <p:spPr>
           <a:xfrm flipH="1" flipV="1">
-            <a:off x="6095592" y="3239958"/>
-            <a:ext cx="22474" cy="2228558"/>
+            <a:off x="10137420" y="1544248"/>
+            <a:ext cx="29566" cy="2197414"/>
           </a:xfrm>
           <a:prstGeom prst="line">
             <a:avLst/>
           </a:prstGeom>
-          <a:ln w="0">
+          <a:ln w="12700">
             <a:solidFill>
               <a:srgbClr val="000000"/>
             </a:solidFill>
@@ -19199,10 +18959,10 @@
       </p:sp>
       <p:sp>
         <p:nvSpPr>
-          <p:cNvPr id="31" name="Line 5">
+          <p:cNvPr id="48" name="Line 4">
             <a:extLst>
               <a:ext uri="{FF2B5EF4-FFF2-40B4-BE49-F238E27FC236}">
-                <a16:creationId xmlns:a16="http://schemas.microsoft.com/office/drawing/2014/main" id="{C0494574-FF52-4570-1E0E-FF6EEB063631}"/>
+                <a16:creationId xmlns:a16="http://schemas.microsoft.com/office/drawing/2014/main" id="{16222E16-CEE6-EFB8-2433-DB01470BD463}"/>
               </a:ext>
             </a:extLst>
           </p:cNvPr>
@@ -19210,14 +18970,14 @@
           <p:nvPr/>
         </p:nvSpPr>
         <p:spPr>
-          <a:xfrm flipH="1" flipV="1">
-            <a:off x="8406680" y="3232850"/>
-            <a:ext cx="25608" cy="2235666"/>
+          <a:xfrm>
+            <a:off x="6096000" y="3232850"/>
+            <a:ext cx="2304000" cy="0"/>
           </a:xfrm>
           <a:prstGeom prst="line">
             <a:avLst/>
           </a:prstGeom>
-          <a:ln w="0">
+          <a:ln w="12700">
             <a:solidFill>
               <a:srgbClr val="000000"/>
             </a:solidFill>
@@ -19246,10 +19006,250 @@
       </p:sp>
       <p:sp>
         <p:nvSpPr>
-          <p:cNvPr id="3" name="Freeform 2">
+          <p:cNvPr id="49" name="Line 4">
             <a:extLst>
               <a:ext uri="{FF2B5EF4-FFF2-40B4-BE49-F238E27FC236}">
-                <a16:creationId xmlns:a16="http://schemas.microsoft.com/office/drawing/2014/main" id="{B13948EE-9A3E-83C5-0077-3128D7224332}"/>
+                <a16:creationId xmlns:a16="http://schemas.microsoft.com/office/drawing/2014/main" id="{0922E9A4-4CA5-F56D-A883-AC57BB27D028}"/>
+              </a:ext>
+            </a:extLst>
+          </p:cNvPr>
+          <p:cNvSpPr/>
+          <p:nvPr/>
+        </p:nvSpPr>
+        <p:spPr>
+          <a:xfrm>
+            <a:off x="6093934" y="5468516"/>
+            <a:ext cx="2341507" cy="0"/>
+          </a:xfrm>
+          <a:prstGeom prst="line">
+            <a:avLst/>
+          </a:prstGeom>
+          <a:ln w="12700">
+            <a:solidFill>
+              <a:srgbClr val="000000"/>
+            </a:solidFill>
+            <a:tailEnd type="none" w="med" len="med"/>
+          </a:ln>
+        </p:spPr>
+        <p:style>
+          <a:lnRef idx="0">
+            <a:scrgbClr r="0" g="0" b="0"/>
+          </a:lnRef>
+          <a:fillRef idx="0">
+            <a:scrgbClr r="0" g="0" b="0"/>
+          </a:fillRef>
+          <a:effectRef idx="0">
+            <a:scrgbClr r="0" g="0" b="0"/>
+          </a:effectRef>
+          <a:fontRef idx="minor"/>
+        </p:style>
+        <p:txBody>
+          <a:bodyPr/>
+          <a:lstStyle/>
+          <a:p>
+            <a:endParaRPr lang="en-US"/>
+          </a:p>
+        </p:txBody>
+      </p:sp>
+      <p:sp>
+        <p:nvSpPr>
+          <p:cNvPr id="50" name="Line 5">
+            <a:extLst>
+              <a:ext uri="{FF2B5EF4-FFF2-40B4-BE49-F238E27FC236}">
+                <a16:creationId xmlns:a16="http://schemas.microsoft.com/office/drawing/2014/main" id="{BDB74D83-4530-9012-7D11-DA22C2926A1B}"/>
+              </a:ext>
+            </a:extLst>
+          </p:cNvPr>
+          <p:cNvSpPr/>
+          <p:nvPr/>
+        </p:nvSpPr>
+        <p:spPr>
+          <a:xfrm flipH="1" flipV="1">
+            <a:off x="6095592" y="3239958"/>
+            <a:ext cx="22474" cy="2228558"/>
+          </a:xfrm>
+          <a:prstGeom prst="line">
+            <a:avLst/>
+          </a:prstGeom>
+          <a:ln w="12700">
+            <a:solidFill>
+              <a:srgbClr val="000000"/>
+            </a:solidFill>
+            <a:tailEnd type="none" w="med" len="med"/>
+          </a:ln>
+        </p:spPr>
+        <p:style>
+          <a:lnRef idx="0">
+            <a:scrgbClr r="0" g="0" b="0"/>
+          </a:lnRef>
+          <a:fillRef idx="0">
+            <a:scrgbClr r="0" g="0" b="0"/>
+          </a:fillRef>
+          <a:effectRef idx="0">
+            <a:scrgbClr r="0" g="0" b="0"/>
+          </a:effectRef>
+          <a:fontRef idx="minor"/>
+        </p:style>
+        <p:txBody>
+          <a:bodyPr/>
+          <a:lstStyle/>
+          <a:p>
+            <a:endParaRPr lang="en-US"/>
+          </a:p>
+        </p:txBody>
+      </p:sp>
+      <p:sp>
+        <p:nvSpPr>
+          <p:cNvPr id="51" name="Line 5">
+            <a:extLst>
+              <a:ext uri="{FF2B5EF4-FFF2-40B4-BE49-F238E27FC236}">
+                <a16:creationId xmlns:a16="http://schemas.microsoft.com/office/drawing/2014/main" id="{43DEA743-BCC5-E0BC-836B-D343FDFD0065}"/>
+              </a:ext>
+            </a:extLst>
+          </p:cNvPr>
+          <p:cNvSpPr/>
+          <p:nvPr/>
+        </p:nvSpPr>
+        <p:spPr>
+          <a:xfrm flipH="1" flipV="1">
+            <a:off x="8406680" y="3232850"/>
+            <a:ext cx="25608" cy="2235666"/>
+          </a:xfrm>
+          <a:prstGeom prst="line">
+            <a:avLst/>
+          </a:prstGeom>
+          <a:ln w="12700">
+            <a:solidFill>
+              <a:srgbClr val="000000"/>
+            </a:solidFill>
+            <a:tailEnd type="none" w="med" len="med"/>
+          </a:ln>
+        </p:spPr>
+        <p:style>
+          <a:lnRef idx="0">
+            <a:scrgbClr r="0" g="0" b="0"/>
+          </a:lnRef>
+          <a:fillRef idx="0">
+            <a:scrgbClr r="0" g="0" b="0"/>
+          </a:fillRef>
+          <a:effectRef idx="0">
+            <a:scrgbClr r="0" g="0" b="0"/>
+          </a:effectRef>
+          <a:fontRef idx="minor"/>
+        </p:style>
+        <p:txBody>
+          <a:bodyPr/>
+          <a:lstStyle/>
+          <a:p>
+            <a:endParaRPr lang="en-US"/>
+          </a:p>
+        </p:txBody>
+      </p:sp>
+      <p:sp>
+        <p:nvSpPr>
+          <p:cNvPr id="52" name="Line 8">
+            <a:extLst>
+              <a:ext uri="{FF2B5EF4-FFF2-40B4-BE49-F238E27FC236}">
+                <a16:creationId xmlns:a16="http://schemas.microsoft.com/office/drawing/2014/main" id="{8B81DEBC-AE36-B479-FD3E-64F318179A20}"/>
+              </a:ext>
+            </a:extLst>
+          </p:cNvPr>
+          <p:cNvSpPr/>
+          <p:nvPr/>
+        </p:nvSpPr>
+        <p:spPr>
+          <a:xfrm flipH="1" flipV="1">
+            <a:off x="7872046" y="2575385"/>
+            <a:ext cx="971013" cy="0"/>
+          </a:xfrm>
+          <a:prstGeom prst="line">
+            <a:avLst/>
+          </a:prstGeom>
+          <a:ln w="36000">
+            <a:solidFill>
+              <a:schemeClr val="accent6"/>
+            </a:solidFill>
+            <a:custDash>
+              <a:ds d="197000" sp="127000"/>
+            </a:custDash>
+            <a:round/>
+          </a:ln>
+        </p:spPr>
+        <p:style>
+          <a:lnRef idx="0">
+            <a:scrgbClr r="0" g="0" b="0"/>
+          </a:lnRef>
+          <a:fillRef idx="0">
+            <a:scrgbClr r="0" g="0" b="0"/>
+          </a:fillRef>
+          <a:effectRef idx="0">
+            <a:scrgbClr r="0" g="0" b="0"/>
+          </a:effectRef>
+          <a:fontRef idx="minor"/>
+        </p:style>
+        <p:txBody>
+          <a:bodyPr/>
+          <a:lstStyle/>
+          <a:p>
+            <a:endParaRPr lang="en-US"/>
+          </a:p>
+        </p:txBody>
+      </p:sp>
+      <p:sp>
+        <p:nvSpPr>
+          <p:cNvPr id="53" name="CustomShape 14">
+            <a:extLst>
+              <a:ext uri="{FF2B5EF4-FFF2-40B4-BE49-F238E27FC236}">
+                <a16:creationId xmlns:a16="http://schemas.microsoft.com/office/drawing/2014/main" id="{2BA413C9-CAD3-4A67-E019-2E72DFD32F53}"/>
+              </a:ext>
+            </a:extLst>
+          </p:cNvPr>
+          <p:cNvSpPr/>
+          <p:nvPr/>
+        </p:nvSpPr>
+        <p:spPr>
+          <a:xfrm>
+            <a:off x="7681297" y="2457720"/>
+            <a:ext cx="360000" cy="360000"/>
+          </a:xfrm>
+          <a:prstGeom prst="ellipse">
+            <a:avLst/>
+          </a:prstGeom>
+          <a:solidFill>
+            <a:srgbClr val="729FCF"/>
+          </a:solidFill>
+          <a:ln w="12700">
+            <a:solidFill>
+              <a:srgbClr val="3465A4"/>
+            </a:solidFill>
+          </a:ln>
+        </p:spPr>
+        <p:style>
+          <a:lnRef idx="0">
+            <a:scrgbClr r="0" g="0" b="0"/>
+          </a:lnRef>
+          <a:fillRef idx="0">
+            <a:scrgbClr r="0" g="0" b="0"/>
+          </a:fillRef>
+          <a:effectRef idx="0">
+            <a:scrgbClr r="0" g="0" b="0"/>
+          </a:effectRef>
+          <a:fontRef idx="minor"/>
+        </p:style>
+        <p:txBody>
+          <a:bodyPr/>
+          <a:lstStyle/>
+          <a:p>
+            <a:endParaRPr lang="en-US"/>
+          </a:p>
+        </p:txBody>
+      </p:sp>
+      <p:sp>
+        <p:nvSpPr>
+          <p:cNvPr id="54" name="Freeform 53">
+            <a:extLst>
+              <a:ext uri="{FF2B5EF4-FFF2-40B4-BE49-F238E27FC236}">
+                <a16:creationId xmlns:a16="http://schemas.microsoft.com/office/drawing/2014/main" id="{1532B884-F0B3-68C3-01D1-43D6AE9D1C74}"/>
               </a:ext>
             </a:extLst>
           </p:cNvPr>
@@ -19320,7 +19320,7 @@
               <a:alpha val="17115"/>
             </a:schemeClr>
           </a:solidFill>
-          <a:ln>
+          <a:ln w="12700">
             <a:solidFill>
               <a:schemeClr val="tx1"/>
             </a:solidFill>
@@ -19358,10 +19358,10 @@
       </p:sp>
       <p:sp>
         <p:nvSpPr>
-          <p:cNvPr id="11" name="TextShape 24">
+          <p:cNvPr id="55" name="TextShape 24">
             <a:extLst>
               <a:ext uri="{FF2B5EF4-FFF2-40B4-BE49-F238E27FC236}">
-                <a16:creationId xmlns:a16="http://schemas.microsoft.com/office/drawing/2014/main" id="{DF31E22C-3455-9705-364B-8BEE2F9BD9A6}"/>
+                <a16:creationId xmlns:a16="http://schemas.microsoft.com/office/drawing/2014/main" id="{19A4B131-F464-A492-3F22-0E851D84C85C}"/>
               </a:ext>
             </a:extLst>
           </p:cNvPr>
@@ -20157,15 +20157,6 @@
 </file>
 
 <file path=customXml/item1.xml><?xml version="1.0" encoding="utf-8"?>
-<?mso-contentType ?>
-<FormTemplates xmlns="http://schemas.microsoft.com/sharepoint/v3/contenttype/forms">
-  <Display>DocumentLibraryForm</Display>
-  <Edit>DocumentLibraryForm</Edit>
-  <New>DocumentLibraryForm</New>
-</FormTemplates>
-</file>
-
-<file path=customXml/item2.xml><?xml version="1.0" encoding="utf-8"?>
 <ct:contentTypeSchema xmlns:ct="http://schemas.microsoft.com/office/2006/metadata/contentType" xmlns:ma="http://schemas.microsoft.com/office/2006/metadata/properties/metaAttributes" ct:_="" ma:_="" ma:contentTypeName="Document" ma:contentTypeID="0x010100B02558F287BC8344AD539CDC4DA17FBC" ma:contentTypeVersion="10" ma:contentTypeDescription="Create a new document." ma:contentTypeScope="" ma:versionID="165e8038d85e89d0753c71c915416bd7">
   <xsd:schema xmlns:xsd="http://www.w3.org/2001/XMLSchema" xmlns:xs="http://www.w3.org/2001/XMLSchema" xmlns:p="http://schemas.microsoft.com/office/2006/metadata/properties" xmlns:ns2="a9a9e2ba-2d19-46fe-bf54-0255447a607c" xmlns:ns3="8e67869f-b319-4f8e-812d-d2b9322169ce" targetNamespace="http://schemas.microsoft.com/office/2006/metadata/properties" ma:root="true" ma:fieldsID="abf99e3026b4072fe3426938b59b700a" ns2:_="" ns3:_="">
     <xsd:import namespace="a9a9e2ba-2d19-46fe-bf54-0255447a607c"/>
@@ -20370,6 +20361,15 @@
 </ct:contentTypeSchema>
 </file>
 
+<file path=customXml/item2.xml><?xml version="1.0" encoding="utf-8"?>
+<?mso-contentType ?>
+<FormTemplates xmlns="http://schemas.microsoft.com/sharepoint/v3/contenttype/forms">
+  <Display>DocumentLibraryForm</Display>
+  <Edit>DocumentLibraryForm</Edit>
+  <New>DocumentLibraryForm</New>
+</FormTemplates>
+</file>
+
 <file path=customXml/item3.xml><?xml version="1.0" encoding="utf-8"?>
 <p:properties xmlns:p="http://schemas.microsoft.com/office/2006/metadata/properties" xmlns:xsi="http://www.w3.org/2001/XMLSchema-instance" xmlns:pc="http://schemas.microsoft.com/office/infopath/2007/PartnerControls">
   <documentManagement/>
@@ -20377,14 +20377,6 @@
 </file>
 
 <file path=customXml/itemProps1.xml><?xml version="1.0" encoding="utf-8"?>
-<ds:datastoreItem xmlns:ds="http://schemas.openxmlformats.org/officeDocument/2006/customXml" ds:itemID="{4A9C8777-C6EC-4528-A529-B1E15BCDF7A3}">
-  <ds:schemaRefs>
-    <ds:schemaRef ds:uri="http://schemas.microsoft.com/sharepoint/v3/contenttype/forms"/>
-  </ds:schemaRefs>
-</ds:datastoreItem>
-</file>
-
-<file path=customXml/itemProps2.xml><?xml version="1.0" encoding="utf-8"?>
 <ds:datastoreItem xmlns:ds="http://schemas.openxmlformats.org/officeDocument/2006/customXml" ds:itemID="{91B57E6C-04A0-4EB4-9DC4-971645A5D1A1}">
   <ds:schemaRefs>
     <ds:schemaRef ds:uri="http://schemas.microsoft.com/office/2006/metadata/contentType"/>
@@ -20399,6 +20391,14 @@
     <ds:schemaRef ds:uri="http://purl.org/dc/elements/1.1/"/>
     <ds:schemaRef ds:uri="http://purl.org/dc/terms/"/>
     <ds:schemaRef ds:uri="http://schemas.microsoft.com/internal/obd"/>
+  </ds:schemaRefs>
+</ds:datastoreItem>
+</file>
+
+<file path=customXml/itemProps2.xml><?xml version="1.0" encoding="utf-8"?>
+<ds:datastoreItem xmlns:ds="http://schemas.openxmlformats.org/officeDocument/2006/customXml" ds:itemID="{4A9C8777-C6EC-4528-A529-B1E15BCDF7A3}">
+  <ds:schemaRefs>
+    <ds:schemaRef ds:uri="http://schemas.microsoft.com/sharepoint/v3/contenttype/forms"/>
   </ds:schemaRefs>
 </ds:datastoreItem>
 </file>

</xml_diff>